<commit_message>
Some chamnges in the pptx file
</commit_message>
<xml_diff>
--- a/10BestPracticeSQLWB.pptx
+++ b/10BestPracticeSQLWB.pptx
@@ -5,38 +5,39 @@
     <p:sldMasterId id="2147483911" r:id="rId1"/>
   </p:sldMasterIdLst>
   <p:notesMasterIdLst>
-    <p:notesMasterId r:id="rId28"/>
+    <p:notesMasterId r:id="rId29"/>
   </p:notesMasterIdLst>
   <p:handoutMasterIdLst>
-    <p:handoutMasterId r:id="rId29"/>
+    <p:handoutMasterId r:id="rId30"/>
   </p:handoutMasterIdLst>
   <p:sldIdLst>
     <p:sldId id="256" r:id="rId2"/>
     <p:sldId id="258" r:id="rId3"/>
     <p:sldId id="257" r:id="rId4"/>
     <p:sldId id="259" r:id="rId5"/>
-    <p:sldId id="278" r:id="rId6"/>
-    <p:sldId id="260" r:id="rId7"/>
-    <p:sldId id="261" r:id="rId8"/>
-    <p:sldId id="262" r:id="rId9"/>
-    <p:sldId id="279" r:id="rId10"/>
-    <p:sldId id="263" r:id="rId11"/>
-    <p:sldId id="264" r:id="rId12"/>
-    <p:sldId id="265" r:id="rId13"/>
-    <p:sldId id="280" r:id="rId14"/>
-    <p:sldId id="266" r:id="rId15"/>
-    <p:sldId id="281" r:id="rId16"/>
-    <p:sldId id="267" r:id="rId17"/>
-    <p:sldId id="268" r:id="rId18"/>
-    <p:sldId id="269" r:id="rId19"/>
-    <p:sldId id="270" r:id="rId20"/>
-    <p:sldId id="271" r:id="rId21"/>
-    <p:sldId id="272" r:id="rId22"/>
-    <p:sldId id="273" r:id="rId23"/>
-    <p:sldId id="274" r:id="rId24"/>
-    <p:sldId id="275" r:id="rId25"/>
-    <p:sldId id="276" r:id="rId26"/>
-    <p:sldId id="277" r:id="rId27"/>
+    <p:sldId id="282" r:id="rId6"/>
+    <p:sldId id="278" r:id="rId7"/>
+    <p:sldId id="260" r:id="rId8"/>
+    <p:sldId id="261" r:id="rId9"/>
+    <p:sldId id="262" r:id="rId10"/>
+    <p:sldId id="279" r:id="rId11"/>
+    <p:sldId id="263" r:id="rId12"/>
+    <p:sldId id="264" r:id="rId13"/>
+    <p:sldId id="265" r:id="rId14"/>
+    <p:sldId id="280" r:id="rId15"/>
+    <p:sldId id="266" r:id="rId16"/>
+    <p:sldId id="281" r:id="rId17"/>
+    <p:sldId id="267" r:id="rId18"/>
+    <p:sldId id="268" r:id="rId19"/>
+    <p:sldId id="269" r:id="rId20"/>
+    <p:sldId id="270" r:id="rId21"/>
+    <p:sldId id="271" r:id="rId22"/>
+    <p:sldId id="272" r:id="rId23"/>
+    <p:sldId id="273" r:id="rId24"/>
+    <p:sldId id="274" r:id="rId25"/>
+    <p:sldId id="275" r:id="rId26"/>
+    <p:sldId id="276" r:id="rId27"/>
+    <p:sldId id="277" r:id="rId28"/>
   </p:sldIdLst>
   <p:sldSz cx="12192000" cy="6858000"/>
   <p:notesSz cx="6858000" cy="9144000"/>
@@ -5799,27 +5800,27 @@
     </dgm:pt>
   </dgm:ptLst>
   <dgm:cxnLst>
+    <dgm:cxn modelId="{2A5884F7-73B5-484E-B46E-640A7D3CC27E}" type="presOf" srcId="{138F8CD9-F8A6-405A-A3A7-F4B5E4659E48}" destId="{09E05677-8D8B-4E44-AE8A-137642DFD844}" srcOrd="0" destOrd="0" presId="urn:microsoft.com/office/officeart/2005/8/layout/vList2"/>
+    <dgm:cxn modelId="{FF8B42AE-B7F3-4043-B8BB-C50A515FD5B5}" srcId="{A60E97C5-6531-42A9-BCE2-1E5967EA6BF1}" destId="{FDF21366-5E52-405A-837A-C8083ABB7DC7}" srcOrd="2" destOrd="0" parTransId="{527563D9-91CB-4ABE-9A4A-22C4AD73D776}" sibTransId="{71FABCAA-57DA-4EB3-B86A-0B4FD42D6B15}"/>
+    <dgm:cxn modelId="{9E70983A-DA67-4197-9E2B-3C76DECFE8F4}" srcId="{2A9838F3-18E0-4141-B150-8F5211586872}" destId="{445EC04A-56DA-4940-9251-C95ED434BEE3}" srcOrd="0" destOrd="0" parTransId="{892EC816-C3D2-4B2B-852B-EF98877BB7CF}" sibTransId="{98730961-A293-4A0B-9E58-E8D41E10638C}"/>
+    <dgm:cxn modelId="{7903B9B6-D35F-4DB2-B4CF-D01A797F6A77}" type="presOf" srcId="{D6247E54-18AA-419F-96B3-7D084A4FD28C}" destId="{2DB16912-7B3F-4655-9FE8-630DCBFE8965}" srcOrd="0" destOrd="0" presId="urn:microsoft.com/office/officeart/2005/8/layout/vList2"/>
+    <dgm:cxn modelId="{B7774081-491A-4F2C-81A0-AF8F8802EBD2}" srcId="{A60E97C5-6531-42A9-BCE2-1E5967EA6BF1}" destId="{2A9838F3-18E0-4141-B150-8F5211586872}" srcOrd="1" destOrd="0" parTransId="{4B8F952E-8C4F-4013-BE5B-05CC14FDAF03}" sibTransId="{3F3681A8-B32A-4439-A30A-529729B3FDAE}"/>
+    <dgm:cxn modelId="{4E5B33CA-2D82-49D6-8F7A-619FFC5A8062}" srcId="{6ACA0162-9CCE-498D-B3C8-C0AE3BF1454E}" destId="{210B1125-8C6E-432B-B733-0AFE4CC5A2CA}" srcOrd="0" destOrd="0" parTransId="{A056BCA4-099A-430E-B262-260D113F4F94}" sibTransId="{8044AC71-C53F-4ED4-946D-D3D0A8BAD503}"/>
     <dgm:cxn modelId="{5CA395D3-8AF9-41E4-BF68-E575E4C35C2A}" type="presOf" srcId="{55D01772-A793-4E5D-8CA2-CB4BB848DA7F}" destId="{2C7F2821-1557-458D-9440-3407E619844F}" srcOrd="0" destOrd="0" presId="urn:microsoft.com/office/officeart/2005/8/layout/vList2"/>
-    <dgm:cxn modelId="{B7774081-491A-4F2C-81A0-AF8F8802EBD2}" srcId="{A60E97C5-6531-42A9-BCE2-1E5967EA6BF1}" destId="{2A9838F3-18E0-4141-B150-8F5211586872}" srcOrd="1" destOrd="0" parTransId="{4B8F952E-8C4F-4013-BE5B-05CC14FDAF03}" sibTransId="{3F3681A8-B32A-4439-A30A-529729B3FDAE}"/>
+    <dgm:cxn modelId="{D070E14A-BE4B-4B45-9F9B-64036AA98CC8}" type="presOf" srcId="{2A9838F3-18E0-4141-B150-8F5211586872}" destId="{A58C8193-9AEB-4270-A789-41DC8B5409DA}" srcOrd="0" destOrd="0" presId="urn:microsoft.com/office/officeart/2005/8/layout/vList2"/>
+    <dgm:cxn modelId="{B146E6A9-AAD5-48D9-9F8C-F246ABF9D55F}" type="presOf" srcId="{B04D6835-EFF8-4A68-9A02-14B684E7852D}" destId="{513BF6B3-44C8-4A94-9219-F54F77465440}" srcOrd="0" destOrd="0" presId="urn:microsoft.com/office/officeart/2005/8/layout/vList2"/>
+    <dgm:cxn modelId="{512CABBA-973A-4180-B489-5D65BE88BDBD}" srcId="{A60E97C5-6531-42A9-BCE2-1E5967EA6BF1}" destId="{D6247E54-18AA-419F-96B3-7D084A4FD28C}" srcOrd="3" destOrd="0" parTransId="{33232D6B-269C-4112-A72E-9562D859EF47}" sibTransId="{1FE30B7C-D4A1-4EC1-9393-8E4F8CF0F277}"/>
+    <dgm:cxn modelId="{A4B71CB7-CFF1-44D3-8EB3-85CD239B86DE}" type="presOf" srcId="{445EC04A-56DA-4940-9251-C95ED434BEE3}" destId="{AE239C4D-3656-4E50-A52A-5172A0D5BA01}" srcOrd="0" destOrd="0" presId="urn:microsoft.com/office/officeart/2005/8/layout/vList2"/>
+    <dgm:cxn modelId="{CBDE24C2-D1EA-4083-8C90-E3209EEF4A11}" type="presOf" srcId="{A60E97C5-6531-42A9-BCE2-1E5967EA6BF1}" destId="{01FD7549-28BE-49A9-A509-C2693D19A2C8}" srcOrd="0" destOrd="0" presId="urn:microsoft.com/office/officeart/2005/8/layout/vList2"/>
+    <dgm:cxn modelId="{25A9D08A-09A2-48F8-B0E2-2B2F91363774}" type="presOf" srcId="{A75AFD28-FB20-41EE-8350-9E782DE2D0B6}" destId="{6FFDD44D-FFB0-4E35-A780-8424F688F840}" srcOrd="0" destOrd="0" presId="urn:microsoft.com/office/officeart/2005/8/layout/vList2"/>
+    <dgm:cxn modelId="{72F7EAD1-7FCE-4B4E-8850-88B829D81C55}" type="presOf" srcId="{FDF21366-5E52-405A-837A-C8083ABB7DC7}" destId="{5AE03D8A-ABF1-4AAC-A189-E7E56EC21340}" srcOrd="0" destOrd="0" presId="urn:microsoft.com/office/officeart/2005/8/layout/vList2"/>
+    <dgm:cxn modelId="{A8354F31-5A67-4093-A628-059FA4126B84}" srcId="{55D01772-A793-4E5D-8CA2-CB4BB848DA7F}" destId="{B04D6835-EFF8-4A68-9A02-14B684E7852D}" srcOrd="0" destOrd="0" parTransId="{5C2C9842-0207-4746-A301-BF007D84E5D3}" sibTransId="{746B9581-DB0F-499C-97F7-48991C5CF278}"/>
     <dgm:cxn modelId="{19F453FE-9AF2-4813-A2AA-973C15F57C47}" srcId="{A60E97C5-6531-42A9-BCE2-1E5967EA6BF1}" destId="{6ACA0162-9CCE-498D-B3C8-C0AE3BF1454E}" srcOrd="0" destOrd="0" parTransId="{9A22A16F-D8BF-4B74-95E0-3C2CF43D42D5}" sibTransId="{5D0D4102-87E5-4393-A719-7D86E91F4A4C}"/>
-    <dgm:cxn modelId="{A8354F31-5A67-4093-A628-059FA4126B84}" srcId="{55D01772-A793-4E5D-8CA2-CB4BB848DA7F}" destId="{B04D6835-EFF8-4A68-9A02-14B684E7852D}" srcOrd="0" destOrd="0" parTransId="{5C2C9842-0207-4746-A301-BF007D84E5D3}" sibTransId="{746B9581-DB0F-499C-97F7-48991C5CF278}"/>
-    <dgm:cxn modelId="{4E5B33CA-2D82-49D6-8F7A-619FFC5A8062}" srcId="{6ACA0162-9CCE-498D-B3C8-C0AE3BF1454E}" destId="{210B1125-8C6E-432B-B733-0AFE4CC5A2CA}" srcOrd="0" destOrd="0" parTransId="{A056BCA4-099A-430E-B262-260D113F4F94}" sibTransId="{8044AC71-C53F-4ED4-946D-D3D0A8BAD503}"/>
-    <dgm:cxn modelId="{9E70983A-DA67-4197-9E2B-3C76DECFE8F4}" srcId="{2A9838F3-18E0-4141-B150-8F5211586872}" destId="{445EC04A-56DA-4940-9251-C95ED434BEE3}" srcOrd="0" destOrd="0" parTransId="{892EC816-C3D2-4B2B-852B-EF98877BB7CF}" sibTransId="{98730961-A293-4A0B-9E58-E8D41E10638C}"/>
-    <dgm:cxn modelId="{25A9D08A-09A2-48F8-B0E2-2B2F91363774}" type="presOf" srcId="{A75AFD28-FB20-41EE-8350-9E782DE2D0B6}" destId="{6FFDD44D-FFB0-4E35-A780-8424F688F840}" srcOrd="0" destOrd="0" presId="urn:microsoft.com/office/officeart/2005/8/layout/vList2"/>
-    <dgm:cxn modelId="{7903B9B6-D35F-4DB2-B4CF-D01A797F6A77}" type="presOf" srcId="{D6247E54-18AA-419F-96B3-7D084A4FD28C}" destId="{2DB16912-7B3F-4655-9FE8-630DCBFE8965}" srcOrd="0" destOrd="0" presId="urn:microsoft.com/office/officeart/2005/8/layout/vList2"/>
-    <dgm:cxn modelId="{512CABBA-973A-4180-B489-5D65BE88BDBD}" srcId="{A60E97C5-6531-42A9-BCE2-1E5967EA6BF1}" destId="{D6247E54-18AA-419F-96B3-7D084A4FD28C}" srcOrd="3" destOrd="0" parTransId="{33232D6B-269C-4112-A72E-9562D859EF47}" sibTransId="{1FE30B7C-D4A1-4EC1-9393-8E4F8CF0F277}"/>
     <dgm:cxn modelId="{740FD79B-10DD-4894-9540-3BA0B6B6607B}" type="presOf" srcId="{210B1125-8C6E-432B-B733-0AFE4CC5A2CA}" destId="{760E8557-0637-414D-85A2-00673CF6BC36}" srcOrd="0" destOrd="0" presId="urn:microsoft.com/office/officeart/2005/8/layout/vList2"/>
-    <dgm:cxn modelId="{FF8B42AE-B7F3-4043-B8BB-C50A515FD5B5}" srcId="{A60E97C5-6531-42A9-BCE2-1E5967EA6BF1}" destId="{FDF21366-5E52-405A-837A-C8083ABB7DC7}" srcOrd="2" destOrd="0" parTransId="{527563D9-91CB-4ABE-9A4A-22C4AD73D776}" sibTransId="{71FABCAA-57DA-4EB3-B86A-0B4FD42D6B15}"/>
-    <dgm:cxn modelId="{A4B71CB7-CFF1-44D3-8EB3-85CD239B86DE}" type="presOf" srcId="{445EC04A-56DA-4940-9251-C95ED434BEE3}" destId="{AE239C4D-3656-4E50-A52A-5172A0D5BA01}" srcOrd="0" destOrd="0" presId="urn:microsoft.com/office/officeart/2005/8/layout/vList2"/>
+    <dgm:cxn modelId="{F7B6434C-6CCC-4D80-8B76-D2D8092536E1}" srcId="{D6247E54-18AA-419F-96B3-7D084A4FD28C}" destId="{138F8CD9-F8A6-405A-A3A7-F4B5E4659E48}" srcOrd="0" destOrd="0" parTransId="{8C362C38-88B6-4458-83DD-F72B8ED7211F}" sibTransId="{C8158107-F7B5-44C9-88D9-D93C39FC6CFB}"/>
+    <dgm:cxn modelId="{E3877FB6-F535-4FC5-A279-02510A47D245}" srcId="{A60E97C5-6531-42A9-BCE2-1E5967EA6BF1}" destId="{55D01772-A793-4E5D-8CA2-CB4BB848DA7F}" srcOrd="4" destOrd="0" parTransId="{EAEDAB24-F368-4212-998A-3BBA84388C14}" sibTransId="{44CD440C-DA14-404C-A3C1-769851BB98BC}"/>
     <dgm:cxn modelId="{3141E15C-F65B-477A-A59E-5399CB6B0165}" srcId="{FDF21366-5E52-405A-837A-C8083ABB7DC7}" destId="{A75AFD28-FB20-41EE-8350-9E782DE2D0B6}" srcOrd="0" destOrd="0" parTransId="{73DA04E9-7BB2-4DDE-8121-266E24E7D417}" sibTransId="{061272CB-0BEE-4679-A810-6C2E8B5D0D8D}"/>
-    <dgm:cxn modelId="{F7B6434C-6CCC-4D80-8B76-D2D8092536E1}" srcId="{D6247E54-18AA-419F-96B3-7D084A4FD28C}" destId="{138F8CD9-F8A6-405A-A3A7-F4B5E4659E48}" srcOrd="0" destOrd="0" parTransId="{8C362C38-88B6-4458-83DD-F72B8ED7211F}" sibTransId="{C8158107-F7B5-44C9-88D9-D93C39FC6CFB}"/>
     <dgm:cxn modelId="{750C7DDB-46BF-45B7-AC05-BEC683ABC0BA}" type="presOf" srcId="{6ACA0162-9CCE-498D-B3C8-C0AE3BF1454E}" destId="{59AC1B09-A772-4142-84C1-C94DE08F13AE}" srcOrd="0" destOrd="0" presId="urn:microsoft.com/office/officeart/2005/8/layout/vList2"/>
-    <dgm:cxn modelId="{E3877FB6-F535-4FC5-A279-02510A47D245}" srcId="{A60E97C5-6531-42A9-BCE2-1E5967EA6BF1}" destId="{55D01772-A793-4E5D-8CA2-CB4BB848DA7F}" srcOrd="4" destOrd="0" parTransId="{EAEDAB24-F368-4212-998A-3BBA84388C14}" sibTransId="{44CD440C-DA14-404C-A3C1-769851BB98BC}"/>
-    <dgm:cxn modelId="{CBDE24C2-D1EA-4083-8C90-E3209EEF4A11}" type="presOf" srcId="{A60E97C5-6531-42A9-BCE2-1E5967EA6BF1}" destId="{01FD7549-28BE-49A9-A509-C2693D19A2C8}" srcOrd="0" destOrd="0" presId="urn:microsoft.com/office/officeart/2005/8/layout/vList2"/>
-    <dgm:cxn modelId="{72F7EAD1-7FCE-4B4E-8850-88B829D81C55}" type="presOf" srcId="{FDF21366-5E52-405A-837A-C8083ABB7DC7}" destId="{5AE03D8A-ABF1-4AAC-A189-E7E56EC21340}" srcOrd="0" destOrd="0" presId="urn:microsoft.com/office/officeart/2005/8/layout/vList2"/>
-    <dgm:cxn modelId="{B146E6A9-AAD5-48D9-9F8C-F246ABF9D55F}" type="presOf" srcId="{B04D6835-EFF8-4A68-9A02-14B684E7852D}" destId="{513BF6B3-44C8-4A94-9219-F54F77465440}" srcOrd="0" destOrd="0" presId="urn:microsoft.com/office/officeart/2005/8/layout/vList2"/>
-    <dgm:cxn modelId="{2A5884F7-73B5-484E-B46E-640A7D3CC27E}" type="presOf" srcId="{138F8CD9-F8A6-405A-A3A7-F4B5E4659E48}" destId="{09E05677-8D8B-4E44-AE8A-137642DFD844}" srcOrd="0" destOrd="0" presId="urn:microsoft.com/office/officeart/2005/8/layout/vList2"/>
-    <dgm:cxn modelId="{D070E14A-BE4B-4B45-9F9B-64036AA98CC8}" type="presOf" srcId="{2A9838F3-18E0-4141-B150-8F5211586872}" destId="{A58C8193-9AEB-4270-A789-41DC8B5409DA}" srcOrd="0" destOrd="0" presId="urn:microsoft.com/office/officeart/2005/8/layout/vList2"/>
     <dgm:cxn modelId="{419EF71C-2AAB-4916-8C3B-4651BB3FB2AF}" type="presParOf" srcId="{01FD7549-28BE-49A9-A509-C2693D19A2C8}" destId="{59AC1B09-A772-4142-84C1-C94DE08F13AE}" srcOrd="0" destOrd="0" presId="urn:microsoft.com/office/officeart/2005/8/layout/vList2"/>
     <dgm:cxn modelId="{B5439A8E-2C49-4F7B-ADFE-A8504E4B9E8E}" type="presParOf" srcId="{01FD7549-28BE-49A9-A509-C2693D19A2C8}" destId="{760E8557-0637-414D-85A2-00673CF6BC36}" srcOrd="1" destOrd="0" presId="urn:microsoft.com/office/officeart/2005/8/layout/vList2"/>
     <dgm:cxn modelId="{A23DA058-F483-4DE8-8444-87E53AAEA898}" type="presParOf" srcId="{01FD7549-28BE-49A9-A509-C2693D19A2C8}" destId="{A58C8193-9AEB-4270-A789-41DC8B5409DA}" srcOrd="2" destOrd="0" presId="urn:microsoft.com/office/officeart/2005/8/layout/vList2"/>
@@ -6614,14 +6615,14 @@
       </dgm:t>
     </dgm:pt>
     <dgm:pt modelId="{0EFCB3FF-1C68-437E-B5F0-B44904375C9E}">
-      <dgm:prSet phldrT="[Текст]"/>
+      <dgm:prSet phldrT="[Текст]" custT="1"/>
       <dgm:spPr/>
       <dgm:t>
         <a:bodyPr/>
         <a:lstStyle/>
         <a:p>
           <a:r>
-            <a:rPr lang="en-US" dirty="0" err="1" smtClean="0">
+            <a:rPr lang="en-US" sz="4000" dirty="0" err="1" smtClean="0">
               <a:solidFill>
                 <a:schemeClr val="tx1"/>
               </a:solidFill>
@@ -6629,7 +6630,7 @@
             <a:t>row_number</a:t>
           </a:r>
           <a:r>
-            <a:rPr lang="en-US" dirty="0" smtClean="0">
+            <a:rPr lang="en-US" sz="4000" dirty="0" smtClean="0">
               <a:solidFill>
                 <a:schemeClr val="tx1"/>
               </a:solidFill>
@@ -6637,7 +6638,7 @@
             <a:t>() over(order by </a:t>
           </a:r>
           <a:r>
-            <a:rPr lang="en-US" dirty="0" err="1" smtClean="0">
+            <a:rPr lang="en-US" sz="4000" dirty="0" err="1" smtClean="0">
               <a:solidFill>
                 <a:schemeClr val="tx1"/>
               </a:solidFill>
@@ -6645,14 +6646,14 @@
             <a:t>date_birth</a:t>
           </a:r>
           <a:r>
-            <a:rPr lang="en-US" dirty="0" smtClean="0">
+            <a:rPr lang="en-US" sz="4000" dirty="0" smtClean="0">
               <a:solidFill>
                 <a:schemeClr val="tx1"/>
               </a:solidFill>
             </a:rPr>
             <a:t>)</a:t>
           </a:r>
-          <a:endParaRPr lang="ru-RU" dirty="0">
+          <a:endParaRPr lang="ru-RU" sz="4000" dirty="0">
             <a:solidFill>
               <a:schemeClr val="tx1"/>
             </a:solidFill>
@@ -6809,11 +6810,11 @@
   <dgm:cxnLst>
     <dgm:cxn modelId="{8A80EF8D-D0D1-4458-8981-1527EA1E6CAB}" srcId="{B4B9F262-1E2D-4529-A33D-C14BEFB8644D}" destId="{0EFCB3FF-1C68-437E-B5F0-B44904375C9E}" srcOrd="0" destOrd="0" parTransId="{38224A63-E79B-4000-9631-CE70CE135D09}" sibTransId="{3E92D785-13F6-4D98-AD39-37F9CC7B58B8}"/>
     <dgm:cxn modelId="{C73BC3C7-EA8B-4F06-A7FD-8719E165E722}" type="presOf" srcId="{0EFCB3FF-1C68-437E-B5F0-B44904375C9E}" destId="{8E543A1E-5573-4CD1-9423-383ECBE1357C}" srcOrd="0" destOrd="0" presId="urn:microsoft.com/office/officeart/2005/8/layout/vList2"/>
+    <dgm:cxn modelId="{D3AD888B-0D4C-4DD2-B12F-23AD7623A33B}" srcId="{0EFCB3FF-1C68-437E-B5F0-B44904375C9E}" destId="{E8DD2F19-51E8-4A4D-B8B1-052D07C0AA69}" srcOrd="1" destOrd="0" parTransId="{E9237DF4-FE30-431B-A963-94A97BD57F8A}" sibTransId="{F2FE59F2-36F7-4F8D-AD3B-C3DD9C077A5D}"/>
     <dgm:cxn modelId="{BEC8BD4C-CC28-4779-9030-E4DE1333C113}" type="presOf" srcId="{C368B757-BB01-4BB0-AEE0-73B4216AA99D}" destId="{612BD086-DE5C-496D-A0CF-EE9ED1B0B4CD}" srcOrd="0" destOrd="0" presId="urn:microsoft.com/office/officeart/2005/8/layout/vList2"/>
-    <dgm:cxn modelId="{D3AD888B-0D4C-4DD2-B12F-23AD7623A33B}" srcId="{0EFCB3FF-1C68-437E-B5F0-B44904375C9E}" destId="{E8DD2F19-51E8-4A4D-B8B1-052D07C0AA69}" srcOrd="1" destOrd="0" parTransId="{E9237DF4-FE30-431B-A963-94A97BD57F8A}" sibTransId="{F2FE59F2-36F7-4F8D-AD3B-C3DD9C077A5D}"/>
     <dgm:cxn modelId="{0677E88F-5AB7-4E57-BCDB-5CEBF205A9D9}" type="presOf" srcId="{E8DD2F19-51E8-4A4D-B8B1-052D07C0AA69}" destId="{612BD086-DE5C-496D-A0CF-EE9ED1B0B4CD}" srcOrd="0" destOrd="1" presId="urn:microsoft.com/office/officeart/2005/8/layout/vList2"/>
+    <dgm:cxn modelId="{0A790E92-8E8B-4645-907B-C0DD10B6DF57}" srcId="{0EFCB3FF-1C68-437E-B5F0-B44904375C9E}" destId="{C368B757-BB01-4BB0-AEE0-73B4216AA99D}" srcOrd="0" destOrd="0" parTransId="{25A470B1-F1F3-47D1-89D1-CCB52FAE967A}" sibTransId="{BCA2D1FA-B25F-4631-9970-4041A627A113}"/>
     <dgm:cxn modelId="{6CCA0DC6-EFCC-4E81-A6A0-54797B5B1258}" type="presOf" srcId="{B4B9F262-1E2D-4529-A33D-C14BEFB8644D}" destId="{2318A6D2-2F3D-41E1-9A00-5A4CF3214F98}" srcOrd="0" destOrd="0" presId="urn:microsoft.com/office/officeart/2005/8/layout/vList2"/>
-    <dgm:cxn modelId="{0A790E92-8E8B-4645-907B-C0DD10B6DF57}" srcId="{0EFCB3FF-1C68-437E-B5F0-B44904375C9E}" destId="{C368B757-BB01-4BB0-AEE0-73B4216AA99D}" srcOrd="0" destOrd="0" parTransId="{25A470B1-F1F3-47D1-89D1-CCB52FAE967A}" sibTransId="{BCA2D1FA-B25F-4631-9970-4041A627A113}"/>
     <dgm:cxn modelId="{7B548EF4-A677-4431-ACB5-3D9C701C2987}" type="presParOf" srcId="{2318A6D2-2F3D-41E1-9A00-5A4CF3214F98}" destId="{8E543A1E-5573-4CD1-9423-383ECBE1357C}" srcOrd="0" destOrd="0" presId="urn:microsoft.com/office/officeart/2005/8/layout/vList2"/>
     <dgm:cxn modelId="{8748CA7A-53D9-4799-A7D0-9CFD0C343936}" type="presParOf" srcId="{2318A6D2-2F3D-41E1-9A00-5A4CF3214F98}" destId="{612BD086-DE5C-496D-A0CF-EE9ED1B0B4CD}" srcOrd="1" destOrd="0" presId="urn:microsoft.com/office/officeart/2005/8/layout/vList2"/>
   </dgm:cxnLst>
@@ -9154,8 +9155,8 @@
       </dsp:nvSpPr>
       <dsp:spPr>
         <a:xfrm>
-          <a:off x="0" y="167099"/>
-          <a:ext cx="10949489" cy="1127295"/>
+          <a:off x="0" y="124157"/>
+          <a:ext cx="10949489" cy="1216800"/>
         </a:xfrm>
         <a:prstGeom prst="roundRect">
           <a:avLst/>
@@ -9196,12 +9197,12 @@
         </a:fontRef>
       </dsp:style>
       <dsp:txBody>
-        <a:bodyPr spcFirstLastPara="0" vert="horz" wrap="square" lIns="179070" tIns="179070" rIns="179070" bIns="179070" numCol="1" spcCol="1270" anchor="ctr" anchorCtr="0">
+        <a:bodyPr spcFirstLastPara="0" vert="horz" wrap="square" lIns="152400" tIns="152400" rIns="152400" bIns="152400" numCol="1" spcCol="1270" anchor="ctr" anchorCtr="0">
           <a:noAutofit/>
         </a:bodyPr>
         <a:lstStyle/>
         <a:p>
-          <a:pPr lvl="0" algn="l" defTabSz="2089150">
+          <a:pPr lvl="0" algn="l" defTabSz="1778000">
             <a:lnSpc>
               <a:spcPct val="90000"/>
             </a:lnSpc>
@@ -9213,7 +9214,7 @@
             </a:spcAft>
           </a:pPr>
           <a:r>
-            <a:rPr lang="en-US" sz="4700" kern="1200" dirty="0" err="1" smtClean="0">
+            <a:rPr lang="en-US" sz="4000" kern="1200" dirty="0" err="1" smtClean="0">
               <a:solidFill>
                 <a:schemeClr val="tx1"/>
               </a:solidFill>
@@ -9221,7 +9222,7 @@
             <a:t>row_number</a:t>
           </a:r>
           <a:r>
-            <a:rPr lang="en-US" sz="4700" kern="1200" dirty="0" smtClean="0">
+            <a:rPr lang="en-US" sz="4000" kern="1200" dirty="0" smtClean="0">
               <a:solidFill>
                 <a:schemeClr val="tx1"/>
               </a:solidFill>
@@ -9229,7 +9230,7 @@
             <a:t>() over(order by </a:t>
           </a:r>
           <a:r>
-            <a:rPr lang="en-US" sz="4700" kern="1200" dirty="0" err="1" smtClean="0">
+            <a:rPr lang="en-US" sz="4000" kern="1200" dirty="0" err="1" smtClean="0">
               <a:solidFill>
                 <a:schemeClr val="tx1"/>
               </a:solidFill>
@@ -9237,14 +9238,14 @@
             <a:t>date_birth</a:t>
           </a:r>
           <a:r>
-            <a:rPr lang="en-US" sz="4700" kern="1200" dirty="0" smtClean="0">
+            <a:rPr lang="en-US" sz="4000" kern="1200" dirty="0" smtClean="0">
               <a:solidFill>
                 <a:schemeClr val="tx1"/>
               </a:solidFill>
             </a:rPr>
             <a:t>)</a:t>
           </a:r>
-          <a:endParaRPr lang="ru-RU" sz="4700" kern="1200" dirty="0">
+          <a:endParaRPr lang="ru-RU" sz="4000" kern="1200" dirty="0">
             <a:solidFill>
               <a:schemeClr val="tx1"/>
             </a:solidFill>
@@ -9252,8 +9253,8 @@
         </a:p>
       </dsp:txBody>
       <dsp:txXfrm>
-        <a:off x="55030" y="222129"/>
-        <a:ext cx="10839429" cy="1017235"/>
+        <a:off x="59399" y="183556"/>
+        <a:ext cx="10830691" cy="1098002"/>
       </dsp:txXfrm>
     </dsp:sp>
     <dsp:sp modelId="{612BD086-DE5C-496D-A0CF-EE9ED1B0B4CD}">
@@ -9263,8 +9264,8 @@
       </dsp:nvSpPr>
       <dsp:spPr>
         <a:xfrm>
-          <a:off x="0" y="1294394"/>
-          <a:ext cx="10949489" cy="1483672"/>
+          <a:off x="0" y="1340958"/>
+          <a:ext cx="10949489" cy="1480049"/>
         </a:xfrm>
         <a:prstGeom prst="rect">
           <a:avLst/>
@@ -9332,8 +9333,8 @@
         </a:p>
       </dsp:txBody>
       <dsp:txXfrm>
-        <a:off x="0" y="1294394"/>
-        <a:ext cx="10949489" cy="1483672"/>
+        <a:off x="0" y="1340958"/>
+        <a:ext cx="10949489" cy="1480049"/>
       </dsp:txXfrm>
     </dsp:sp>
   </dsp:spTree>
@@ -18956,7 +18957,7 @@
           <a:p>
             <a:fld id="{5B304CED-D883-43F5-873B-22B8F37264B6}" type="datetimeFigureOut">
               <a:rPr lang="ru-RU" smtClean="0"/>
-              <a:t>22.10.2018</a:t>
+              <a:t>27.10.2018</a:t>
             </a:fld>
             <a:endParaRPr lang="ru-RU"/>
           </a:p>
@@ -19121,7 +19122,7 @@
           <a:p>
             <a:fld id="{D0C63A68-5AFD-48CA-B27F-3F64F27B3D78}" type="datetimeFigureOut">
               <a:rPr lang="ru-RU" smtClean="0"/>
-              <a:t>22.10.2018</a:t>
+              <a:t>27.10.2018</a:t>
             </a:fld>
             <a:endParaRPr lang="ru-RU"/>
           </a:p>
@@ -19557,6 +19558,90 @@
 </p:notes>
 </file>
 
+<file path=ppt/notesSlides/notesSlide3.xml><?xml version="1.0" encoding="utf-8"?>
+<p:notes xmlns:a="http://schemas.openxmlformats.org/drawingml/2006/main" xmlns:r="http://schemas.openxmlformats.org/officeDocument/2006/relationships" xmlns:p="http://schemas.openxmlformats.org/presentationml/2006/main">
+  <p:cSld>
+    <p:spTree>
+      <p:nvGrpSpPr>
+        <p:cNvPr id="1" name=""/>
+        <p:cNvGrpSpPr/>
+        <p:nvPr/>
+      </p:nvGrpSpPr>
+      <p:grpSpPr>
+        <a:xfrm>
+          <a:off x="0" y="0"/>
+          <a:ext cx="0" cy="0"/>
+          <a:chOff x="0" y="0"/>
+          <a:chExt cx="0" cy="0"/>
+        </a:xfrm>
+      </p:grpSpPr>
+      <p:sp>
+        <p:nvSpPr>
+          <p:cNvPr id="2" name="Образ слайда 1"/>
+          <p:cNvSpPr>
+            <a:spLocks noGrp="1" noRot="1" noChangeAspect="1"/>
+          </p:cNvSpPr>
+          <p:nvPr>
+            <p:ph type="sldImg"/>
+          </p:nvPr>
+        </p:nvSpPr>
+        <p:spPr/>
+      </p:sp>
+      <p:sp>
+        <p:nvSpPr>
+          <p:cNvPr id="3" name="Заметки 2"/>
+          <p:cNvSpPr>
+            <a:spLocks noGrp="1"/>
+          </p:cNvSpPr>
+          <p:nvPr>
+            <p:ph type="body" idx="1"/>
+          </p:nvPr>
+        </p:nvSpPr>
+        <p:spPr/>
+        <p:txBody>
+          <a:bodyPr/>
+          <a:lstStyle/>
+          <a:p>
+            <a:endParaRPr lang="ru-RU" dirty="0"/>
+          </a:p>
+        </p:txBody>
+      </p:sp>
+      <p:sp>
+        <p:nvSpPr>
+          <p:cNvPr id="4" name="Номер слайда 3"/>
+          <p:cNvSpPr>
+            <a:spLocks noGrp="1"/>
+          </p:cNvSpPr>
+          <p:nvPr>
+            <p:ph type="sldNum" sz="quarter" idx="10"/>
+          </p:nvPr>
+        </p:nvSpPr>
+        <p:spPr/>
+        <p:txBody>
+          <a:bodyPr/>
+          <a:lstStyle/>
+          <a:p>
+            <a:fld id="{F89123A4-3C4B-48A8-93A2-BF1429C90EFB}" type="slidenum">
+              <a:rPr lang="ru-RU" smtClean="0"/>
+              <a:t>4</a:t>
+            </a:fld>
+            <a:endParaRPr lang="ru-RU"/>
+          </a:p>
+        </p:txBody>
+      </p:sp>
+    </p:spTree>
+    <p:extLst>
+      <p:ext uri="{BB962C8B-B14F-4D97-AF65-F5344CB8AC3E}">
+        <p14:creationId xmlns:p14="http://schemas.microsoft.com/office/powerpoint/2010/main" val="1492716741"/>
+      </p:ext>
+    </p:extLst>
+  </p:cSld>
+  <p:clrMapOvr>
+    <a:masterClrMapping/>
+  </p:clrMapOvr>
+</p:notes>
+</file>
+
 <file path=ppt/slideLayouts/slideLayout1.xml><?xml version="1.0" encoding="utf-8"?>
 <p:sldLayout xmlns:a="http://schemas.openxmlformats.org/drawingml/2006/main" xmlns:r="http://schemas.openxmlformats.org/officeDocument/2006/relationships" xmlns:p="http://schemas.openxmlformats.org/presentationml/2006/main" showMasterSp="0" type="title" preserve="1">
   <p:cSld name="Титульный слайд">
@@ -21369,7 +21454,7 @@
           <a:p>
             <a:fld id="{061CBD08-A39B-49E4-80FB-A4347CBC0A63}" type="datetime1">
               <a:rPr lang="en-US" smtClean="0"/>
-              <a:t>10/22/2018</a:t>
+              <a:t>10/27/2018</a:t>
             </a:fld>
             <a:endParaRPr lang="en-US" dirty="0"/>
           </a:p>
@@ -21603,7 +21688,7 @@
           <a:p>
             <a:fld id="{5F51C18B-43C2-49D4-A4F9-0EA6D86D6A7F}" type="datetime1">
               <a:rPr lang="en-US" smtClean="0"/>
-              <a:t>10/22/2018</a:t>
+              <a:t>10/27/2018</a:t>
             </a:fld>
             <a:endParaRPr lang="en-US" dirty="0"/>
           </a:p>
@@ -21684,7 +21769,7 @@
             </a:fld>
             <a:r>
               <a:rPr lang="en-US" dirty="0" smtClean="0"/>
-              <a:t> of 26</a:t>
+              <a:t> of 27</a:t>
             </a:r>
             <a:endParaRPr lang="en-US" dirty="0" smtClean="0"/>
           </a:p>
@@ -21800,7 +21885,7 @@
           <a:p>
             <a:fld id="{95E9468B-EA64-421F-9F9D-ABDB662C2983}" type="datetime1">
               <a:rPr lang="en-US" smtClean="0"/>
-              <a:t>10/22/2018</a:t>
+              <a:t>10/27/2018</a:t>
             </a:fld>
             <a:endParaRPr lang="en-US" dirty="0"/>
           </a:p>
@@ -21881,7 +21966,7 @@
             </a:fld>
             <a:r>
               <a:rPr lang="en-US" dirty="0" smtClean="0"/>
-              <a:t> of 26</a:t>
+              <a:t> of 27</a:t>
             </a:r>
             <a:endParaRPr lang="en-US" dirty="0" smtClean="0"/>
           </a:p>
@@ -23676,7 +23761,7 @@
           <a:p>
             <a:fld id="{E4E72C89-1B41-4F93-9AD4-CC28113899C4}" type="datetime1">
               <a:rPr lang="en-US" smtClean="0"/>
-              <a:t>10/22/2018</a:t>
+              <a:t>10/27/2018</a:t>
             </a:fld>
             <a:endParaRPr lang="en-US" dirty="0"/>
           </a:p>
@@ -25573,7 +25658,7 @@
           <a:p>
             <a:fld id="{69A0CB87-367B-4CEE-BCD2-913AF59CE826}" type="datetime1">
               <a:rPr lang="en-US" smtClean="0"/>
-              <a:t>10/22/2018</a:t>
+              <a:t>10/27/2018</a:t>
             </a:fld>
             <a:endParaRPr lang="en-US" dirty="0"/>
           </a:p>
@@ -25836,7 +25921,7 @@
           <a:p>
             <a:fld id="{8486EC5B-2674-4CBC-B3D0-5675077CBA9A}" type="datetime1">
               <a:rPr lang="en-US" smtClean="0"/>
-              <a:t>10/22/2018</a:t>
+              <a:t>10/27/2018</a:t>
             </a:fld>
             <a:endParaRPr lang="en-US" dirty="0"/>
           </a:p>
@@ -26250,35 +26335,35 @@
           <a:p>
             <a:pPr lvl="0"/>
             <a:r>
-              <a:rPr lang="ru-RU" smtClean="0"/>
+              <a:rPr lang="ru-RU" dirty="0" smtClean="0"/>
               <a:t>Образец текста</a:t>
             </a:r>
           </a:p>
           <a:p>
             <a:pPr lvl="1"/>
             <a:r>
-              <a:rPr lang="ru-RU" smtClean="0"/>
+              <a:rPr lang="ru-RU" dirty="0" smtClean="0"/>
               <a:t>Второй уровень</a:t>
             </a:r>
           </a:p>
           <a:p>
             <a:pPr lvl="2"/>
             <a:r>
-              <a:rPr lang="ru-RU" smtClean="0"/>
+              <a:rPr lang="ru-RU" dirty="0" smtClean="0"/>
               <a:t>Третий уровень</a:t>
             </a:r>
           </a:p>
           <a:p>
             <a:pPr lvl="3"/>
             <a:r>
-              <a:rPr lang="ru-RU" smtClean="0"/>
+              <a:rPr lang="ru-RU" dirty="0" smtClean="0"/>
               <a:t>Четвертый уровень</a:t>
             </a:r>
           </a:p>
           <a:p>
             <a:pPr lvl="4"/>
             <a:r>
-              <a:rPr lang="ru-RU" smtClean="0"/>
+              <a:rPr lang="ru-RU" dirty="0" smtClean="0"/>
               <a:t>Пятый уровень</a:t>
             </a:r>
             <a:endParaRPr lang="en-US" dirty="0"/>
@@ -26302,7 +26387,7 @@
           <a:p>
             <a:fld id="{BC0C869D-4B8A-4CFF-8D69-EFC3BDCE3367}" type="datetime1">
               <a:rPr lang="en-US" smtClean="0"/>
-              <a:t>10/22/2018</a:t>
+              <a:t>10/27/2018</a:t>
             </a:fld>
             <a:endParaRPr lang="en-US" dirty="0"/>
           </a:p>
@@ -26379,7 +26464,7 @@
             </a:fld>
             <a:r>
               <a:rPr lang="en-US" dirty="0" smtClean="0"/>
-              <a:t> of 26</a:t>
+              <a:t> of 27</a:t>
             </a:r>
             <a:endParaRPr lang="en-US" dirty="0" smtClean="0"/>
           </a:p>
@@ -26465,7 +26550,7 @@
           <a:p>
             <a:fld id="{33135352-AD10-456E-BBD2-57133A37D9C2}" type="datetime1">
               <a:rPr lang="en-US" smtClean="0"/>
-              <a:t>10/22/2018</a:t>
+              <a:t>10/27/2018</a:t>
             </a:fld>
             <a:endParaRPr lang="en-US" dirty="0"/>
           </a:p>
@@ -26542,7 +26627,7 @@
             </a:fld>
             <a:r>
               <a:rPr lang="en-US" dirty="0" smtClean="0"/>
-              <a:t> of 26</a:t>
+              <a:t> of 27</a:t>
             </a:r>
             <a:endParaRPr lang="en-US" dirty="0" smtClean="0"/>
           </a:p>
@@ -28222,7 +28307,7 @@
           <a:p>
             <a:fld id="{6E3D90A1-C4B9-4824-A746-49746123FCDC}" type="datetime1">
               <a:rPr lang="en-US" smtClean="0"/>
-              <a:t>10/22/2018</a:t>
+              <a:t>10/27/2018</a:t>
             </a:fld>
             <a:endParaRPr lang="en-US" dirty="0"/>
           </a:p>
@@ -28293,7 +28378,7 @@
             </a:fld>
             <a:r>
               <a:rPr lang="en-US" dirty="0" smtClean="0"/>
-              <a:t> of 26</a:t>
+              <a:t> of 27</a:t>
             </a:r>
             <a:endParaRPr lang="en-US" dirty="0"/>
           </a:p>
@@ -28409,7 +28494,7 @@
           <a:p>
             <a:fld id="{ED5CA3AF-280C-4D78-8C35-56D6FC845859}" type="datetime1">
               <a:rPr lang="en-US" smtClean="0"/>
-              <a:t>10/22/2018</a:t>
+              <a:t>10/27/2018</a:t>
             </a:fld>
             <a:endParaRPr lang="en-US" dirty="0"/>
           </a:p>
@@ -28494,7 +28579,7 @@
             </a:fld>
             <a:r>
               <a:rPr lang="en-US" dirty="0" smtClean="0"/>
-              <a:t> of 26</a:t>
+              <a:t> of 27</a:t>
             </a:r>
             <a:endParaRPr lang="en-US" dirty="0" smtClean="0"/>
           </a:p>
@@ -32074,7 +32159,7 @@
           <a:p>
             <a:fld id="{487C3701-57FC-452F-B7C6-F5D580F26C9D}" type="datetime1">
               <a:rPr lang="en-US" smtClean="0"/>
-              <a:t>10/22/2018</a:t>
+              <a:t>10/27/2018</a:t>
             </a:fld>
             <a:endParaRPr lang="en-US" dirty="0"/>
           </a:p>
@@ -33953,7 +34038,7 @@
           <a:p>
             <a:fld id="{AD249A34-D297-4BCE-B688-FC7AFCB392FE}" type="datetime1">
               <a:rPr lang="en-US" smtClean="0"/>
-              <a:t>10/22/2018</a:t>
+              <a:t>10/27/2018</a:t>
             </a:fld>
             <a:endParaRPr lang="en-US" dirty="0"/>
           </a:p>
@@ -34595,15 +34680,7 @@
                   <a:schemeClr val="tx1"/>
                 </a:solidFill>
               </a:rPr>
-              <a:t>October </a:t>
-            </a:r>
-            <a:r>
-              <a:rPr lang="en-US" sz="3600" dirty="0" smtClean="0">
-                <a:solidFill>
-                  <a:schemeClr val="tx1"/>
-                </a:solidFill>
-              </a:rPr>
-              <a:t>2018</a:t>
+              <a:t>October 2018</a:t>
             </a:r>
             <a:endParaRPr lang="ru-RU" sz="3600" dirty="0">
               <a:solidFill>
@@ -34655,6 +34732,178 @@
       </p:grpSpPr>
       <p:sp>
         <p:nvSpPr>
+          <p:cNvPr id="4" name="Нижний колонтитул 3"/>
+          <p:cNvSpPr>
+            <a:spLocks noGrp="1"/>
+          </p:cNvSpPr>
+          <p:nvPr>
+            <p:ph type="ftr" sz="quarter" idx="11"/>
+          </p:nvPr>
+        </p:nvSpPr>
+        <p:spPr/>
+        <p:txBody>
+          <a:bodyPr/>
+          <a:lstStyle/>
+          <a:p>
+            <a:r>
+              <a:rPr lang="en-US" sz="1800" dirty="0" smtClean="0"/>
+              <a:t>© Igor </a:t>
+            </a:r>
+            <a:r>
+              <a:rPr lang="en-US" sz="1800" dirty="0" err="1" smtClean="0"/>
+              <a:t>Gorbenko</a:t>
+            </a:r>
+            <a:r>
+              <a:rPr lang="en-US" sz="1800" dirty="0" smtClean="0"/>
+              <a:t>, SPB, 2018</a:t>
+            </a:r>
+            <a:endParaRPr lang="en-US" sz="1800" dirty="0"/>
+          </a:p>
+        </p:txBody>
+      </p:sp>
+      <p:sp>
+        <p:nvSpPr>
+          <p:cNvPr id="5" name="Номер слайда 4"/>
+          <p:cNvSpPr>
+            <a:spLocks noGrp="1"/>
+          </p:cNvSpPr>
+          <p:nvPr>
+            <p:ph type="sldNum" sz="quarter" idx="12"/>
+          </p:nvPr>
+        </p:nvSpPr>
+        <p:spPr/>
+        <p:txBody>
+          <a:bodyPr/>
+          <a:lstStyle/>
+          <a:p>
+            <a:r>
+              <a:rPr lang="en-US" dirty="0"/>
+              <a:t>Page </a:t>
+            </a:r>
+            <a:fld id="{D57F1E4F-1CFF-5643-939E-217C01CDF565}" type="slidenum">
+              <a:rPr lang="en-US"/>
+              <a:pPr/>
+              <a:t>10</a:t>
+            </a:fld>
+            <a:r>
+              <a:rPr lang="en-US" dirty="0"/>
+              <a:t> of </a:t>
+            </a:r>
+            <a:r>
+              <a:rPr lang="en-US" dirty="0" smtClean="0"/>
+              <a:t>27</a:t>
+            </a:r>
+            <a:endParaRPr lang="en-US" dirty="0"/>
+          </a:p>
+        </p:txBody>
+      </p:sp>
+      <p:sp>
+        <p:nvSpPr>
+          <p:cNvPr id="2" name="Заголовок 1"/>
+          <p:cNvSpPr>
+            <a:spLocks noGrp="1"/>
+          </p:cNvSpPr>
+          <p:nvPr>
+            <p:ph type="title"/>
+          </p:nvPr>
+        </p:nvSpPr>
+        <p:spPr>
+          <a:xfrm>
+            <a:off x="787402" y="938035"/>
+            <a:ext cx="10337798" cy="558800"/>
+          </a:xfrm>
+        </p:spPr>
+        <p:txBody>
+          <a:bodyPr>
+            <a:noAutofit/>
+          </a:bodyPr>
+          <a:lstStyle/>
+          <a:p>
+            <a:pPr algn="r"/>
+            <a:r>
+              <a:rPr lang="en-US" sz="4000" dirty="0" smtClean="0"/>
+              <a:t>3</a:t>
+            </a:r>
+            <a:r>
+              <a:rPr lang="ru-RU" sz="4000" dirty="0" smtClean="0"/>
+              <a:t>. </a:t>
+            </a:r>
+            <a:r>
+              <a:rPr lang="en-US" sz="4000" dirty="0"/>
+              <a:t>The closest birthday this week and the age of the client</a:t>
+            </a:r>
+            <a:endParaRPr lang="ru-RU" sz="4000" dirty="0"/>
+          </a:p>
+        </p:txBody>
+      </p:sp>
+      <p:pic>
+        <p:nvPicPr>
+          <p:cNvPr id="11" name="Объект 10"/>
+          <p:cNvPicPr>
+            <a:picLocks noGrp="1" noChangeAspect="1"/>
+          </p:cNvPicPr>
+          <p:nvPr>
+            <p:ph idx="1"/>
+          </p:nvPr>
+        </p:nvPicPr>
+        <p:blipFill>
+          <a:blip r:embed="rId2"/>
+          <a:stretch>
+            <a:fillRect/>
+          </a:stretch>
+        </p:blipFill>
+        <p:spPr>
+          <a:xfrm>
+            <a:off x="1010445" y="1579225"/>
+            <a:ext cx="9891711" cy="4588549"/>
+          </a:xfrm>
+          <a:prstGeom prst="rect">
+            <a:avLst/>
+          </a:prstGeom>
+        </p:spPr>
+      </p:pic>
+    </p:spTree>
+    <p:extLst>
+      <p:ext uri="{BB962C8B-B14F-4D97-AF65-F5344CB8AC3E}">
+        <p14:creationId xmlns:p14="http://schemas.microsoft.com/office/powerpoint/2010/main" val="525399833"/>
+      </p:ext>
+    </p:extLst>
+  </p:cSld>
+  <p:clrMapOvr>
+    <a:masterClrMapping/>
+  </p:clrMapOvr>
+  <p:transition spd="slow">
+    <p:split orient="vert"/>
+  </p:transition>
+  <p:timing>
+    <p:tnLst>
+      <p:par>
+        <p:cTn id="1" dur="indefinite" restart="never" nodeType="tmRoot"/>
+      </p:par>
+    </p:tnLst>
+  </p:timing>
+</p:sld>
+</file>
+
+<file path=ppt/slides/slide11.xml><?xml version="1.0" encoding="utf-8"?>
+<p:sld xmlns:a="http://schemas.openxmlformats.org/drawingml/2006/main" xmlns:r="http://schemas.openxmlformats.org/officeDocument/2006/relationships" xmlns:p="http://schemas.openxmlformats.org/presentationml/2006/main">
+  <p:cSld>
+    <p:spTree>
+      <p:nvGrpSpPr>
+        <p:cNvPr id="1" name=""/>
+        <p:cNvGrpSpPr/>
+        <p:nvPr/>
+      </p:nvGrpSpPr>
+      <p:grpSpPr>
+        <a:xfrm>
+          <a:off x="0" y="0"/>
+          <a:ext cx="0" cy="0"/>
+          <a:chOff x="0" y="0"/>
+          <a:chExt cx="0" cy="0"/>
+        </a:xfrm>
+      </p:grpSpPr>
+      <p:sp>
+        <p:nvSpPr>
           <p:cNvPr id="2" name="Заголовок 1"/>
           <p:cNvSpPr>
             <a:spLocks noGrp="1"/>
@@ -34794,7 +35043,7 @@
             <a:fld id="{D57F1E4F-1CFF-5643-939E-217C01CDF565}" type="slidenum">
               <a:rPr lang="en-US"/>
               <a:pPr/>
-              <a:t>10</a:t>
+              <a:t>11</a:t>
             </a:fld>
             <a:r>
               <a:rPr lang="en-US" dirty="0"/>
@@ -34802,7 +35051,7 @@
             </a:r>
             <a:r>
               <a:rPr lang="en-US" dirty="0" smtClean="0"/>
-              <a:t>26</a:t>
+              <a:t>27</a:t>
             </a:r>
             <a:endParaRPr lang="en-US" dirty="0"/>
           </a:p>
@@ -34831,7 +35080,7 @@
 </p:sld>
 </file>
 
-<file path=ppt/slides/slide11.xml><?xml version="1.0" encoding="utf-8"?>
+<file path=ppt/slides/slide12.xml><?xml version="1.0" encoding="utf-8"?>
 <p:sld xmlns:a="http://schemas.openxmlformats.org/drawingml/2006/main" xmlns:r="http://schemas.openxmlformats.org/officeDocument/2006/relationships" xmlns:p="http://schemas.openxmlformats.org/presentationml/2006/main">
   <p:cSld>
     <p:spTree>
@@ -35142,7 +35391,7 @@
             <a:fld id="{D57F1E4F-1CFF-5643-939E-217C01CDF565}" type="slidenum">
               <a:rPr lang="en-US"/>
               <a:pPr/>
-              <a:t>11</a:t>
+              <a:t>12</a:t>
             </a:fld>
             <a:r>
               <a:rPr lang="en-US" dirty="0"/>
@@ -35150,7 +35399,7 @@
             </a:r>
             <a:r>
               <a:rPr lang="en-US" dirty="0" smtClean="0"/>
-              <a:t>26</a:t>
+              <a:t>27</a:t>
             </a:r>
             <a:endParaRPr lang="en-US" dirty="0"/>
           </a:p>
@@ -35417,7 +35666,7 @@
 </p:sld>
 </file>
 
-<file path=ppt/slides/slide12.xml><?xml version="1.0" encoding="utf-8"?>
+<file path=ppt/slides/slide13.xml><?xml version="1.0" encoding="utf-8"?>
 <p:sld xmlns:a="http://schemas.openxmlformats.org/drawingml/2006/main" xmlns:r="http://schemas.openxmlformats.org/officeDocument/2006/relationships" xmlns:p="http://schemas.openxmlformats.org/presentationml/2006/main">
   <p:cSld>
     <p:spTree>
@@ -35520,7 +35769,7 @@
             <a:fld id="{D57F1E4F-1CFF-5643-939E-217C01CDF565}" type="slidenum">
               <a:rPr lang="en-US"/>
               <a:pPr/>
-              <a:t>12</a:t>
+              <a:t>13</a:t>
             </a:fld>
             <a:r>
               <a:rPr lang="en-US" dirty="0"/>
@@ -35528,7 +35777,7 @@
             </a:r>
             <a:r>
               <a:rPr lang="en-US" dirty="0" smtClean="0"/>
-              <a:t>26</a:t>
+              <a:t>27</a:t>
             </a:r>
             <a:endParaRPr lang="en-US" dirty="0"/>
           </a:p>
@@ -35583,201 +35832,6 @@
 </p:sld>
 </file>
 
-<file path=ppt/slides/slide13.xml><?xml version="1.0" encoding="utf-8"?>
-<p:sld xmlns:a="http://schemas.openxmlformats.org/drawingml/2006/main" xmlns:r="http://schemas.openxmlformats.org/officeDocument/2006/relationships" xmlns:p="http://schemas.openxmlformats.org/presentationml/2006/main">
-  <p:cSld>
-    <p:spTree>
-      <p:nvGrpSpPr>
-        <p:cNvPr id="1" name=""/>
-        <p:cNvGrpSpPr/>
-        <p:nvPr/>
-      </p:nvGrpSpPr>
-      <p:grpSpPr>
-        <a:xfrm>
-          <a:off x="0" y="0"/>
-          <a:ext cx="0" cy="0"/>
-          <a:chOff x="0" y="0"/>
-          <a:chExt cx="0" cy="0"/>
-        </a:xfrm>
-      </p:grpSpPr>
-      <p:sp>
-        <p:nvSpPr>
-          <p:cNvPr id="2" name="Заголовок 1"/>
-          <p:cNvSpPr>
-            <a:spLocks noGrp="1"/>
-          </p:cNvSpPr>
-          <p:nvPr>
-            <p:ph type="title"/>
-          </p:nvPr>
-        </p:nvSpPr>
-        <p:spPr/>
-        <p:txBody>
-          <a:bodyPr>
-            <a:normAutofit/>
-          </a:bodyPr>
-          <a:lstStyle/>
-          <a:p>
-            <a:r>
-              <a:rPr lang="ru-RU" dirty="0"/>
-              <a:t>4</a:t>
-            </a:r>
-            <a:r>
-              <a:rPr lang="ru-RU" dirty="0" smtClean="0"/>
-              <a:t>. </a:t>
-            </a:r>
-            <a:r>
-              <a:rPr lang="en-US" dirty="0"/>
-              <a:t>Updating Data Using Window Functions</a:t>
-            </a:r>
-            <a:endParaRPr lang="ru-RU" dirty="0"/>
-          </a:p>
-        </p:txBody>
-      </p:sp>
-      <p:sp>
-        <p:nvSpPr>
-          <p:cNvPr id="13" name="Текст 12"/>
-          <p:cNvSpPr>
-            <a:spLocks noGrp="1"/>
-          </p:cNvSpPr>
-          <p:nvPr>
-            <p:ph type="body" sz="quarter" idx="3"/>
-          </p:nvPr>
-        </p:nvSpPr>
-        <p:spPr>
-          <a:xfrm>
-            <a:off x="3376864" y="2257073"/>
-            <a:ext cx="5438272" cy="639762"/>
-          </a:xfrm>
-        </p:spPr>
-        <p:txBody>
-          <a:bodyPr>
-            <a:normAutofit/>
-          </a:bodyPr>
-          <a:lstStyle/>
-          <a:p>
-            <a:r>
-              <a:rPr lang="en-US" sz="3000" dirty="0"/>
-              <a:t>Description of functions</a:t>
-            </a:r>
-            <a:endParaRPr lang="ru-RU" sz="3000" dirty="0"/>
-          </a:p>
-        </p:txBody>
-      </p:sp>
-      <p:graphicFrame>
-        <p:nvGraphicFramePr>
-          <p:cNvPr id="15" name="Объект 14"/>
-          <p:cNvGraphicFramePr>
-            <a:graphicFrameLocks noGrp="1"/>
-          </p:cNvGraphicFramePr>
-          <p:nvPr>
-            <p:ph sz="quarter" idx="4"/>
-            <p:extLst>
-              <p:ext uri="{D42A27DB-BD31-4B8C-83A1-F6EECF244321}">
-                <p14:modId xmlns:p14="http://schemas.microsoft.com/office/powerpoint/2010/main" val="2456668396"/>
-              </p:ext>
-            </p:extLst>
-          </p:nvPr>
-        </p:nvGraphicFramePr>
-        <p:xfrm>
-          <a:off x="632910" y="2896835"/>
-          <a:ext cx="10949490" cy="2945166"/>
-        </p:xfrm>
-        <a:graphic>
-          <a:graphicData uri="http://schemas.openxmlformats.org/drawingml/2006/diagram">
-            <dgm:relIds xmlns:dgm="http://schemas.openxmlformats.org/drawingml/2006/diagram" xmlns:r="http://schemas.openxmlformats.org/officeDocument/2006/relationships" r:dm="rId2" r:lo="rId3" r:qs="rId4" r:cs="rId5"/>
-          </a:graphicData>
-        </a:graphic>
-      </p:graphicFrame>
-      <p:sp>
-        <p:nvSpPr>
-          <p:cNvPr id="4" name="Нижний колонтитул 3"/>
-          <p:cNvSpPr>
-            <a:spLocks noGrp="1"/>
-          </p:cNvSpPr>
-          <p:nvPr>
-            <p:ph type="ftr" sz="quarter" idx="11"/>
-          </p:nvPr>
-        </p:nvSpPr>
-        <p:spPr/>
-        <p:txBody>
-          <a:bodyPr/>
-          <a:lstStyle/>
-          <a:p>
-            <a:r>
-              <a:rPr lang="en-US" sz="1800" dirty="0" smtClean="0"/>
-              <a:t>© Igor </a:t>
-            </a:r>
-            <a:r>
-              <a:rPr lang="en-US" sz="1800" dirty="0" err="1" smtClean="0"/>
-              <a:t>Gorbenko</a:t>
-            </a:r>
-            <a:r>
-              <a:rPr lang="en-US" sz="1800" dirty="0" smtClean="0"/>
-              <a:t>, SPB, 2018</a:t>
-            </a:r>
-            <a:endParaRPr lang="en-US" sz="1800" dirty="0"/>
-          </a:p>
-        </p:txBody>
-      </p:sp>
-      <p:sp>
-        <p:nvSpPr>
-          <p:cNvPr id="5" name="Номер слайда 4"/>
-          <p:cNvSpPr>
-            <a:spLocks noGrp="1"/>
-          </p:cNvSpPr>
-          <p:nvPr>
-            <p:ph type="sldNum" sz="quarter" idx="12"/>
-          </p:nvPr>
-        </p:nvSpPr>
-        <p:spPr/>
-        <p:txBody>
-          <a:bodyPr/>
-          <a:lstStyle/>
-          <a:p>
-            <a:r>
-              <a:rPr lang="en-US" dirty="0"/>
-              <a:t>Page </a:t>
-            </a:r>
-            <a:fld id="{D57F1E4F-1CFF-5643-939E-217C01CDF565}" type="slidenum">
-              <a:rPr lang="en-US"/>
-              <a:pPr/>
-              <a:t>13</a:t>
-            </a:fld>
-            <a:r>
-              <a:rPr lang="en-US" dirty="0"/>
-              <a:t> of </a:t>
-            </a:r>
-            <a:r>
-              <a:rPr lang="en-US" dirty="0" smtClean="0"/>
-              <a:t>26</a:t>
-            </a:r>
-            <a:endParaRPr lang="en-US" dirty="0"/>
-          </a:p>
-        </p:txBody>
-      </p:sp>
-    </p:spTree>
-    <p:extLst>
-      <p:ext uri="{BB962C8B-B14F-4D97-AF65-F5344CB8AC3E}">
-        <p14:creationId xmlns:p14="http://schemas.microsoft.com/office/powerpoint/2010/main" val="210895599"/>
-      </p:ext>
-    </p:extLst>
-  </p:cSld>
-  <p:clrMapOvr>
-    <a:masterClrMapping/>
-  </p:clrMapOvr>
-  <p:transition spd="slow">
-    <p:split orient="vert"/>
-  </p:transition>
-  <p:timing>
-    <p:tnLst>
-      <p:par>
-        <p:cTn id="1" dur="indefinite" restart="never" nodeType="tmRoot"/>
-      </p:par>
-    </p:tnLst>
-  </p:timing>
-</p:sld>
-</file>
-
 <file path=ppt/slides/slide14.xml><?xml version="1.0" encoding="utf-8"?>
 <p:sld xmlns:a="http://schemas.openxmlformats.org/drawingml/2006/main" xmlns:r="http://schemas.openxmlformats.org/officeDocument/2006/relationships" xmlns:p="http://schemas.openxmlformats.org/presentationml/2006/main">
   <p:cSld>
@@ -35813,6 +35867,201 @@
           <a:lstStyle/>
           <a:p>
             <a:r>
+              <a:rPr lang="ru-RU" dirty="0"/>
+              <a:t>4</a:t>
+            </a:r>
+            <a:r>
+              <a:rPr lang="ru-RU" dirty="0" smtClean="0"/>
+              <a:t>. </a:t>
+            </a:r>
+            <a:r>
+              <a:rPr lang="en-US" dirty="0"/>
+              <a:t>Updating Data Using Window Functions</a:t>
+            </a:r>
+            <a:endParaRPr lang="ru-RU" dirty="0"/>
+          </a:p>
+        </p:txBody>
+      </p:sp>
+      <p:sp>
+        <p:nvSpPr>
+          <p:cNvPr id="13" name="Текст 12"/>
+          <p:cNvSpPr>
+            <a:spLocks noGrp="1"/>
+          </p:cNvSpPr>
+          <p:nvPr>
+            <p:ph type="body" sz="quarter" idx="3"/>
+          </p:nvPr>
+        </p:nvSpPr>
+        <p:spPr>
+          <a:xfrm>
+            <a:off x="3376864" y="2257073"/>
+            <a:ext cx="5438272" cy="639762"/>
+          </a:xfrm>
+        </p:spPr>
+        <p:txBody>
+          <a:bodyPr>
+            <a:normAutofit/>
+          </a:bodyPr>
+          <a:lstStyle/>
+          <a:p>
+            <a:r>
+              <a:rPr lang="en-US" sz="3000" dirty="0"/>
+              <a:t>Description of functions</a:t>
+            </a:r>
+            <a:endParaRPr lang="ru-RU" sz="3000" dirty="0"/>
+          </a:p>
+        </p:txBody>
+      </p:sp>
+      <p:graphicFrame>
+        <p:nvGraphicFramePr>
+          <p:cNvPr id="15" name="Объект 14"/>
+          <p:cNvGraphicFramePr>
+            <a:graphicFrameLocks noGrp="1"/>
+          </p:cNvGraphicFramePr>
+          <p:nvPr>
+            <p:ph sz="quarter" idx="4"/>
+            <p:extLst>
+              <p:ext uri="{D42A27DB-BD31-4B8C-83A1-F6EECF244321}">
+                <p14:modId xmlns:p14="http://schemas.microsoft.com/office/powerpoint/2010/main" val="4101331496"/>
+              </p:ext>
+            </p:extLst>
+          </p:nvPr>
+        </p:nvGraphicFramePr>
+        <p:xfrm>
+          <a:off x="632910" y="2896835"/>
+          <a:ext cx="10949490" cy="2945166"/>
+        </p:xfrm>
+        <a:graphic>
+          <a:graphicData uri="http://schemas.openxmlformats.org/drawingml/2006/diagram">
+            <dgm:relIds xmlns:dgm="http://schemas.openxmlformats.org/drawingml/2006/diagram" xmlns:r="http://schemas.openxmlformats.org/officeDocument/2006/relationships" r:dm="rId2" r:lo="rId3" r:qs="rId4" r:cs="rId5"/>
+          </a:graphicData>
+        </a:graphic>
+      </p:graphicFrame>
+      <p:sp>
+        <p:nvSpPr>
+          <p:cNvPr id="4" name="Нижний колонтитул 3"/>
+          <p:cNvSpPr>
+            <a:spLocks noGrp="1"/>
+          </p:cNvSpPr>
+          <p:nvPr>
+            <p:ph type="ftr" sz="quarter" idx="11"/>
+          </p:nvPr>
+        </p:nvSpPr>
+        <p:spPr/>
+        <p:txBody>
+          <a:bodyPr/>
+          <a:lstStyle/>
+          <a:p>
+            <a:r>
+              <a:rPr lang="en-US" sz="1800" dirty="0" smtClean="0"/>
+              <a:t>© Igor </a:t>
+            </a:r>
+            <a:r>
+              <a:rPr lang="en-US" sz="1800" dirty="0" err="1" smtClean="0"/>
+              <a:t>Gorbenko</a:t>
+            </a:r>
+            <a:r>
+              <a:rPr lang="en-US" sz="1800" dirty="0" smtClean="0"/>
+              <a:t>, SPB, 2018</a:t>
+            </a:r>
+            <a:endParaRPr lang="en-US" sz="1800" dirty="0"/>
+          </a:p>
+        </p:txBody>
+      </p:sp>
+      <p:sp>
+        <p:nvSpPr>
+          <p:cNvPr id="5" name="Номер слайда 4"/>
+          <p:cNvSpPr>
+            <a:spLocks noGrp="1"/>
+          </p:cNvSpPr>
+          <p:nvPr>
+            <p:ph type="sldNum" sz="quarter" idx="12"/>
+          </p:nvPr>
+        </p:nvSpPr>
+        <p:spPr/>
+        <p:txBody>
+          <a:bodyPr/>
+          <a:lstStyle/>
+          <a:p>
+            <a:r>
+              <a:rPr lang="en-US" dirty="0"/>
+              <a:t>Page </a:t>
+            </a:r>
+            <a:fld id="{D57F1E4F-1CFF-5643-939E-217C01CDF565}" type="slidenum">
+              <a:rPr lang="en-US"/>
+              <a:pPr/>
+              <a:t>14</a:t>
+            </a:fld>
+            <a:r>
+              <a:rPr lang="en-US" dirty="0"/>
+              <a:t> of </a:t>
+            </a:r>
+            <a:r>
+              <a:rPr lang="en-US" dirty="0" smtClean="0"/>
+              <a:t>27</a:t>
+            </a:r>
+            <a:endParaRPr lang="en-US" dirty="0"/>
+          </a:p>
+        </p:txBody>
+      </p:sp>
+    </p:spTree>
+    <p:extLst>
+      <p:ext uri="{BB962C8B-B14F-4D97-AF65-F5344CB8AC3E}">
+        <p14:creationId xmlns:p14="http://schemas.microsoft.com/office/powerpoint/2010/main" val="210895599"/>
+      </p:ext>
+    </p:extLst>
+  </p:cSld>
+  <p:clrMapOvr>
+    <a:masterClrMapping/>
+  </p:clrMapOvr>
+  <p:transition spd="slow">
+    <p:split orient="vert"/>
+  </p:transition>
+  <p:timing>
+    <p:tnLst>
+      <p:par>
+        <p:cTn id="1" dur="indefinite" restart="never" nodeType="tmRoot"/>
+      </p:par>
+    </p:tnLst>
+  </p:timing>
+</p:sld>
+</file>
+
+<file path=ppt/slides/slide15.xml><?xml version="1.0" encoding="utf-8"?>
+<p:sld xmlns:a="http://schemas.openxmlformats.org/drawingml/2006/main" xmlns:r="http://schemas.openxmlformats.org/officeDocument/2006/relationships" xmlns:p="http://schemas.openxmlformats.org/presentationml/2006/main">
+  <p:cSld>
+    <p:spTree>
+      <p:nvGrpSpPr>
+        <p:cNvPr id="1" name=""/>
+        <p:cNvGrpSpPr/>
+        <p:nvPr/>
+      </p:nvGrpSpPr>
+      <p:grpSpPr>
+        <a:xfrm>
+          <a:off x="0" y="0"/>
+          <a:ext cx="0" cy="0"/>
+          <a:chOff x="0" y="0"/>
+          <a:chExt cx="0" cy="0"/>
+        </a:xfrm>
+      </p:grpSpPr>
+      <p:sp>
+        <p:nvSpPr>
+          <p:cNvPr id="2" name="Заголовок 1"/>
+          <p:cNvSpPr>
+            <a:spLocks noGrp="1"/>
+          </p:cNvSpPr>
+          <p:nvPr>
+            <p:ph type="title"/>
+          </p:nvPr>
+        </p:nvSpPr>
+        <p:spPr/>
+        <p:txBody>
+          <a:bodyPr>
+            <a:normAutofit/>
+          </a:bodyPr>
+          <a:lstStyle/>
+          <a:p>
+            <a:r>
               <a:rPr lang="ru-RU" dirty="0" smtClean="0"/>
               <a:t>5. </a:t>
             </a:r>
@@ -35905,7 +36154,7 @@
             <a:fld id="{D57F1E4F-1CFF-5643-939E-217C01CDF565}" type="slidenum">
               <a:rPr lang="en-US"/>
               <a:pPr/>
-              <a:t>14</a:t>
+              <a:t>15</a:t>
             </a:fld>
             <a:r>
               <a:rPr lang="en-US" dirty="0"/>
@@ -35913,7 +36162,7 @@
             </a:r>
             <a:r>
               <a:rPr lang="en-US" dirty="0" smtClean="0"/>
-              <a:t>26</a:t>
+              <a:t>27</a:t>
             </a:r>
             <a:endParaRPr lang="en-US" dirty="0"/>
           </a:p>
@@ -35968,7 +36217,7 @@
 </p:sld>
 </file>
 
-<file path=ppt/slides/slide15.xml><?xml version="1.0" encoding="utf-8"?>
+<file path=ppt/slides/slide16.xml><?xml version="1.0" encoding="utf-8"?>
 <p:sld xmlns:a="http://schemas.openxmlformats.org/drawingml/2006/main" xmlns:r="http://schemas.openxmlformats.org/officeDocument/2006/relationships" xmlns:p="http://schemas.openxmlformats.org/presentationml/2006/main">
   <p:cSld>
     <p:spTree>
@@ -36135,7 +36384,7 @@
             <a:fld id="{D57F1E4F-1CFF-5643-939E-217C01CDF565}" type="slidenum">
               <a:rPr lang="en-US"/>
               <a:pPr/>
-              <a:t>15</a:t>
+              <a:t>16</a:t>
             </a:fld>
             <a:r>
               <a:rPr lang="en-US" dirty="0"/>
@@ -36143,7 +36392,7 @@
             </a:r>
             <a:r>
               <a:rPr lang="en-US" dirty="0" smtClean="0"/>
-              <a:t>26</a:t>
+              <a:t>27</a:t>
             </a:r>
             <a:endParaRPr lang="en-US" dirty="0"/>
           </a:p>
@@ -36251,7 +36500,7 @@
 </p:sld>
 </file>
 
-<file path=ppt/slides/slide16.xml><?xml version="1.0" encoding="utf-8"?>
+<file path=ppt/slides/slide17.xml><?xml version="1.0" encoding="utf-8"?>
 <p:sld xmlns:a="http://schemas.openxmlformats.org/drawingml/2006/main" xmlns:r="http://schemas.openxmlformats.org/officeDocument/2006/relationships" xmlns:p="http://schemas.openxmlformats.org/presentationml/2006/main">
   <p:cSld>
     <p:spTree>
@@ -36744,11 +36993,6 @@
               </a:rPr>
               <a:t>      </a:t>
             </a:r>
-            <a:endParaRPr lang="en-US" sz="1300" dirty="0" smtClean="0">
-              <a:latin typeface="Courier New" pitchFamily="49" charset="0"/>
-              <a:ea typeface="Calibri"/>
-              <a:cs typeface="Courier New" pitchFamily="49" charset="0"/>
-            </a:endParaRPr>
           </a:p>
           <a:p>
             <a:pPr marL="0" indent="0" algn="just">
@@ -37626,7 +37870,7 @@
             <a:fld id="{D57F1E4F-1CFF-5643-939E-217C01CDF565}" type="slidenum">
               <a:rPr lang="en-US"/>
               <a:pPr/>
-              <a:t>16</a:t>
+              <a:t>17</a:t>
             </a:fld>
             <a:r>
               <a:rPr lang="en-US" dirty="0"/>
@@ -37634,7 +37878,7 @@
             </a:r>
             <a:r>
               <a:rPr lang="en-US" dirty="0" smtClean="0"/>
-              <a:t>26</a:t>
+              <a:t>27</a:t>
             </a:r>
             <a:endParaRPr lang="en-US" dirty="0"/>
           </a:p>
@@ -37663,7 +37907,7 @@
 </p:sld>
 </file>
 
-<file path=ppt/slides/slide17.xml><?xml version="1.0" encoding="utf-8"?>
+<file path=ppt/slides/slide18.xml><?xml version="1.0" encoding="utf-8"?>
 <p:sld xmlns:a="http://schemas.openxmlformats.org/drawingml/2006/main" xmlns:r="http://schemas.openxmlformats.org/officeDocument/2006/relationships" xmlns:p="http://schemas.openxmlformats.org/presentationml/2006/main">
   <p:cSld>
     <p:spTree>
@@ -38000,7 +38244,7 @@
             <a:fld id="{D57F1E4F-1CFF-5643-939E-217C01CDF565}" type="slidenum">
               <a:rPr lang="en-US"/>
               <a:pPr/>
-              <a:t>17</a:t>
+              <a:t>18</a:t>
             </a:fld>
             <a:r>
               <a:rPr lang="en-US" dirty="0"/>
@@ -38008,7 +38252,7 @@
             </a:r>
             <a:r>
               <a:rPr lang="en-US" dirty="0" smtClean="0"/>
-              <a:t>26</a:t>
+              <a:t>27</a:t>
             </a:r>
             <a:endParaRPr lang="en-US" dirty="0"/>
           </a:p>
@@ -38037,7 +38281,7 @@
 </p:sld>
 </file>
 
-<file path=ppt/slides/slide18.xml><?xml version="1.0" encoding="utf-8"?>
+<file path=ppt/slides/slide19.xml><?xml version="1.0" encoding="utf-8"?>
 <p:sld xmlns:a="http://schemas.openxmlformats.org/drawingml/2006/main" xmlns:r="http://schemas.openxmlformats.org/officeDocument/2006/relationships" xmlns:p="http://schemas.openxmlformats.org/presentationml/2006/main">
   <p:cSld>
     <p:spTree>
@@ -38193,7 +38437,7 @@
             <a:fld id="{D57F1E4F-1CFF-5643-939E-217C01CDF565}" type="slidenum">
               <a:rPr lang="en-US"/>
               <a:pPr/>
-              <a:t>18</a:t>
+              <a:t>19</a:t>
             </a:fld>
             <a:r>
               <a:rPr lang="en-US" dirty="0"/>
@@ -38201,7 +38445,7 @@
             </a:r>
             <a:r>
               <a:rPr lang="en-US" dirty="0" smtClean="0"/>
-              <a:t>26</a:t>
+              <a:t>27</a:t>
             </a:r>
             <a:endParaRPr lang="en-US" dirty="0"/>
           </a:p>
@@ -38230,7 +38474,264 @@
 </p:sld>
 </file>
 
-<file path=ppt/slides/slide19.xml><?xml version="1.0" encoding="utf-8"?>
+<file path=ppt/slides/slide2.xml><?xml version="1.0" encoding="utf-8"?>
+<p:sld xmlns:a="http://schemas.openxmlformats.org/drawingml/2006/main" xmlns:r="http://schemas.openxmlformats.org/officeDocument/2006/relationships" xmlns:p="http://schemas.openxmlformats.org/presentationml/2006/main">
+  <p:cSld>
+    <p:spTree>
+      <p:nvGrpSpPr>
+        <p:cNvPr id="1" name=""/>
+        <p:cNvGrpSpPr/>
+        <p:nvPr/>
+      </p:nvGrpSpPr>
+      <p:grpSpPr>
+        <a:xfrm>
+          <a:off x="0" y="0"/>
+          <a:ext cx="0" cy="0"/>
+          <a:chOff x="0" y="0"/>
+          <a:chExt cx="0" cy="0"/>
+        </a:xfrm>
+      </p:grpSpPr>
+      <p:sp>
+        <p:nvSpPr>
+          <p:cNvPr id="7" name="Нижний колонтитул 6"/>
+          <p:cNvSpPr>
+            <a:spLocks noGrp="1"/>
+          </p:cNvSpPr>
+          <p:nvPr>
+            <p:ph type="ftr" sz="quarter" idx="11"/>
+          </p:nvPr>
+        </p:nvSpPr>
+        <p:spPr/>
+        <p:txBody>
+          <a:bodyPr/>
+          <a:lstStyle/>
+          <a:p>
+            <a:r>
+              <a:rPr lang="en-US" sz="1800" smtClean="0"/>
+              <a:t>© Igor Gorbenko, SPB, 2018</a:t>
+            </a:r>
+            <a:endParaRPr lang="en-US" sz="1800" dirty="0"/>
+          </a:p>
+        </p:txBody>
+      </p:sp>
+      <p:sp>
+        <p:nvSpPr>
+          <p:cNvPr id="4" name="Заголовок 3"/>
+          <p:cNvSpPr>
+            <a:spLocks noGrp="1"/>
+          </p:cNvSpPr>
+          <p:nvPr>
+            <p:ph type="title"/>
+          </p:nvPr>
+        </p:nvSpPr>
+        <p:spPr>
+          <a:xfrm>
+            <a:off x="421103" y="0"/>
+            <a:ext cx="3140241" cy="738738"/>
+          </a:xfrm>
+        </p:spPr>
+        <p:txBody>
+          <a:bodyPr/>
+          <a:lstStyle/>
+          <a:p>
+            <a:r>
+              <a:rPr lang="en-US" smtClean="0">
+                <a:solidFill>
+                  <a:schemeClr val="bg1"/>
+                </a:solidFill>
+              </a:rPr>
+              <a:t>About me</a:t>
+            </a:r>
+            <a:endParaRPr lang="ru-RU" dirty="0">
+              <a:solidFill>
+                <a:schemeClr val="bg1"/>
+              </a:solidFill>
+            </a:endParaRPr>
+          </a:p>
+        </p:txBody>
+      </p:sp>
+      <p:sp>
+        <p:nvSpPr>
+          <p:cNvPr id="5" name="Объект 4"/>
+          <p:cNvSpPr>
+            <a:spLocks noGrp="1"/>
+          </p:cNvSpPr>
+          <p:nvPr>
+            <p:ph idx="1"/>
+          </p:nvPr>
+        </p:nvSpPr>
+        <p:spPr/>
+        <p:txBody>
+          <a:bodyPr>
+            <a:normAutofit lnSpcReduction="10000"/>
+          </a:bodyPr>
+          <a:lstStyle/>
+          <a:p>
+            <a:r>
+              <a:rPr lang="en-US" b="1" smtClean="0"/>
+              <a:t>Igor Gorbenko</a:t>
+            </a:r>
+            <a:endParaRPr lang="ru-RU" b="1" smtClean="0"/>
+          </a:p>
+          <a:p>
+            <a:r>
+              <a:rPr lang="en-US" smtClean="0"/>
+              <a:t>Lead Data Analyst, First Line Software</a:t>
+            </a:r>
+            <a:endParaRPr lang="ru-RU" smtClean="0"/>
+          </a:p>
+          <a:p>
+            <a:endParaRPr lang="ru-RU" smtClean="0"/>
+          </a:p>
+          <a:p>
+            <a:r>
+              <a:rPr lang="en-US" smtClean="0"/>
+              <a:t>Professional interests:</a:t>
+            </a:r>
+            <a:endParaRPr lang="ru-RU" smtClean="0"/>
+          </a:p>
+          <a:p>
+            <a:pPr lvl="1">
+              <a:buFont typeface="Wingdings" pitchFamily="2" charset="2"/>
+              <a:buChar char="§"/>
+            </a:pPr>
+            <a:r>
+              <a:rPr lang="en-US" smtClean="0"/>
+              <a:t>RDBMS</a:t>
+            </a:r>
+          </a:p>
+          <a:p>
+            <a:pPr lvl="1">
+              <a:buFont typeface="Wingdings" pitchFamily="2" charset="2"/>
+              <a:buChar char="§"/>
+            </a:pPr>
+            <a:r>
+              <a:rPr lang="en-US" smtClean="0"/>
+              <a:t>Big Data</a:t>
+            </a:r>
+          </a:p>
+          <a:p>
+            <a:pPr lvl="1">
+              <a:buFont typeface="Wingdings" pitchFamily="2" charset="2"/>
+              <a:buChar char="§"/>
+            </a:pPr>
+            <a:r>
+              <a:rPr lang="en-US" smtClean="0"/>
+              <a:t>Data Analysis</a:t>
+            </a:r>
+          </a:p>
+          <a:p>
+            <a:pPr lvl="1">
+              <a:buFont typeface="Wingdings" pitchFamily="2" charset="2"/>
+              <a:buChar char="§"/>
+            </a:pPr>
+            <a:endParaRPr lang="en-US" smtClean="0"/>
+          </a:p>
+          <a:p>
+            <a:r>
+              <a:rPr lang="en-US" smtClean="0"/>
+              <a:t>Professional experience with SQL for more than 10 years</a:t>
+            </a:r>
+            <a:endParaRPr lang="ru-RU" dirty="0"/>
+          </a:p>
+        </p:txBody>
+      </p:sp>
+      <p:pic>
+        <p:nvPicPr>
+          <p:cNvPr id="8" name="Рисунок 7"/>
+          <p:cNvPicPr>
+            <a:picLocks noChangeAspect="1"/>
+          </p:cNvPicPr>
+          <p:nvPr/>
+        </p:nvPicPr>
+        <p:blipFill>
+          <a:blip r:embed="rId3">
+            <a:extLst>
+              <a:ext uri="{28A0092B-C50C-407E-A947-70E740481C1C}">
+                <a14:useLocalDpi xmlns:a14="http://schemas.microsoft.com/office/drawing/2010/main" val="0"/>
+              </a:ext>
+            </a:extLst>
+          </a:blip>
+          <a:stretch>
+            <a:fillRect/>
+          </a:stretch>
+        </p:blipFill>
+        <p:spPr>
+          <a:xfrm>
+            <a:off x="258185" y="1016576"/>
+            <a:ext cx="3720011" cy="4955750"/>
+          </a:xfrm>
+          <a:prstGeom prst="rect">
+            <a:avLst/>
+          </a:prstGeom>
+          <a:ln>
+            <a:noFill/>
+          </a:ln>
+          <a:effectLst>
+            <a:softEdge rad="112500"/>
+          </a:effectLst>
+        </p:spPr>
+      </p:pic>
+      <p:sp>
+        <p:nvSpPr>
+          <p:cNvPr id="3" name="Номер слайда 2"/>
+          <p:cNvSpPr>
+            <a:spLocks noGrp="1"/>
+          </p:cNvSpPr>
+          <p:nvPr>
+            <p:ph type="sldNum" sz="quarter" idx="12"/>
+          </p:nvPr>
+        </p:nvSpPr>
+        <p:spPr/>
+        <p:txBody>
+          <a:bodyPr/>
+          <a:lstStyle/>
+          <a:p>
+            <a:r>
+              <a:rPr lang="en-US" dirty="0"/>
+              <a:t>Page </a:t>
+            </a:r>
+            <a:fld id="{D57F1E4F-1CFF-5643-939E-217C01CDF565}" type="slidenum">
+              <a:rPr lang="en-US"/>
+              <a:pPr/>
+              <a:t>2</a:t>
+            </a:fld>
+            <a:r>
+              <a:rPr lang="en-US" dirty="0"/>
+              <a:t> of </a:t>
+            </a:r>
+            <a:r>
+              <a:rPr lang="en-US" dirty="0" smtClean="0"/>
+              <a:t>27</a:t>
+            </a:r>
+            <a:endParaRPr lang="en-US" dirty="0" smtClean="0"/>
+          </a:p>
+        </p:txBody>
+      </p:sp>
+    </p:spTree>
+    <p:extLst>
+      <p:ext uri="{BB962C8B-B14F-4D97-AF65-F5344CB8AC3E}">
+        <p14:creationId xmlns:p14="http://schemas.microsoft.com/office/powerpoint/2010/main" val="1568432226"/>
+      </p:ext>
+    </p:extLst>
+  </p:cSld>
+  <p:clrMapOvr>
+    <a:masterClrMapping/>
+  </p:clrMapOvr>
+  <p:transition spd="med">
+    <p:pull/>
+  </p:transition>
+  <p:timing>
+    <p:tnLst>
+      <p:par>
+        <p:cTn id="1" dur="indefinite" restart="never" nodeType="tmRoot"/>
+      </p:par>
+    </p:tnLst>
+  </p:timing>
+</p:sld>
+</file>
+
+<file path=ppt/slides/slide20.xml><?xml version="1.0" encoding="utf-8"?>
 <p:sld xmlns:a="http://schemas.openxmlformats.org/drawingml/2006/main" xmlns:r="http://schemas.openxmlformats.org/officeDocument/2006/relationships" xmlns:p="http://schemas.openxmlformats.org/presentationml/2006/main">
   <p:cSld>
     <p:spTree>
@@ -38364,7 +38865,7 @@
             <a:fld id="{D57F1E4F-1CFF-5643-939E-217C01CDF565}" type="slidenum">
               <a:rPr lang="en-US"/>
               <a:pPr/>
-              <a:t>19</a:t>
+              <a:t>20</a:t>
             </a:fld>
             <a:r>
               <a:rPr lang="en-US" dirty="0"/>
@@ -38372,7 +38873,7 @@
             </a:r>
             <a:r>
               <a:rPr lang="en-US" dirty="0" smtClean="0"/>
-              <a:t>26</a:t>
+              <a:t>27</a:t>
             </a:r>
             <a:endParaRPr lang="en-US" dirty="0"/>
           </a:p>
@@ -38506,264 +39007,7 @@
 </p:sld>
 </file>
 
-<file path=ppt/slides/slide2.xml><?xml version="1.0" encoding="utf-8"?>
-<p:sld xmlns:a="http://schemas.openxmlformats.org/drawingml/2006/main" xmlns:r="http://schemas.openxmlformats.org/officeDocument/2006/relationships" xmlns:p="http://schemas.openxmlformats.org/presentationml/2006/main">
-  <p:cSld>
-    <p:spTree>
-      <p:nvGrpSpPr>
-        <p:cNvPr id="1" name=""/>
-        <p:cNvGrpSpPr/>
-        <p:nvPr/>
-      </p:nvGrpSpPr>
-      <p:grpSpPr>
-        <a:xfrm>
-          <a:off x="0" y="0"/>
-          <a:ext cx="0" cy="0"/>
-          <a:chOff x="0" y="0"/>
-          <a:chExt cx="0" cy="0"/>
-        </a:xfrm>
-      </p:grpSpPr>
-      <p:sp>
-        <p:nvSpPr>
-          <p:cNvPr id="7" name="Нижний колонтитул 6"/>
-          <p:cNvSpPr>
-            <a:spLocks noGrp="1"/>
-          </p:cNvSpPr>
-          <p:nvPr>
-            <p:ph type="ftr" sz="quarter" idx="11"/>
-          </p:nvPr>
-        </p:nvSpPr>
-        <p:spPr/>
-        <p:txBody>
-          <a:bodyPr/>
-          <a:lstStyle/>
-          <a:p>
-            <a:r>
-              <a:rPr lang="en-US" sz="1800" smtClean="0"/>
-              <a:t>© Igor Gorbenko, SPB, 2018</a:t>
-            </a:r>
-            <a:endParaRPr lang="en-US" sz="1800" dirty="0"/>
-          </a:p>
-        </p:txBody>
-      </p:sp>
-      <p:sp>
-        <p:nvSpPr>
-          <p:cNvPr id="4" name="Заголовок 3"/>
-          <p:cNvSpPr>
-            <a:spLocks noGrp="1"/>
-          </p:cNvSpPr>
-          <p:nvPr>
-            <p:ph type="title"/>
-          </p:nvPr>
-        </p:nvSpPr>
-        <p:spPr>
-          <a:xfrm>
-            <a:off x="421103" y="0"/>
-            <a:ext cx="3140241" cy="738738"/>
-          </a:xfrm>
-        </p:spPr>
-        <p:txBody>
-          <a:bodyPr/>
-          <a:lstStyle/>
-          <a:p>
-            <a:r>
-              <a:rPr lang="en-US" smtClean="0">
-                <a:solidFill>
-                  <a:schemeClr val="bg1"/>
-                </a:solidFill>
-              </a:rPr>
-              <a:t>About me</a:t>
-            </a:r>
-            <a:endParaRPr lang="ru-RU" dirty="0">
-              <a:solidFill>
-                <a:schemeClr val="bg1"/>
-              </a:solidFill>
-            </a:endParaRPr>
-          </a:p>
-        </p:txBody>
-      </p:sp>
-      <p:sp>
-        <p:nvSpPr>
-          <p:cNvPr id="5" name="Объект 4"/>
-          <p:cNvSpPr>
-            <a:spLocks noGrp="1"/>
-          </p:cNvSpPr>
-          <p:nvPr>
-            <p:ph idx="1"/>
-          </p:nvPr>
-        </p:nvSpPr>
-        <p:spPr/>
-        <p:txBody>
-          <a:bodyPr>
-            <a:normAutofit lnSpcReduction="10000"/>
-          </a:bodyPr>
-          <a:lstStyle/>
-          <a:p>
-            <a:r>
-              <a:rPr lang="en-US" b="1" smtClean="0"/>
-              <a:t>Igor Gorbenko</a:t>
-            </a:r>
-            <a:endParaRPr lang="ru-RU" b="1" smtClean="0"/>
-          </a:p>
-          <a:p>
-            <a:r>
-              <a:rPr lang="en-US" smtClean="0"/>
-              <a:t>Lead Data Analyst, First Line Software</a:t>
-            </a:r>
-            <a:endParaRPr lang="ru-RU" smtClean="0"/>
-          </a:p>
-          <a:p>
-            <a:endParaRPr lang="ru-RU" smtClean="0"/>
-          </a:p>
-          <a:p>
-            <a:r>
-              <a:rPr lang="en-US" smtClean="0"/>
-              <a:t>Professional interests:</a:t>
-            </a:r>
-            <a:endParaRPr lang="ru-RU" smtClean="0"/>
-          </a:p>
-          <a:p>
-            <a:pPr lvl="1">
-              <a:buFont typeface="Wingdings" pitchFamily="2" charset="2"/>
-              <a:buChar char="§"/>
-            </a:pPr>
-            <a:r>
-              <a:rPr lang="en-US" smtClean="0"/>
-              <a:t>RDBMS</a:t>
-            </a:r>
-          </a:p>
-          <a:p>
-            <a:pPr lvl="1">
-              <a:buFont typeface="Wingdings" pitchFamily="2" charset="2"/>
-              <a:buChar char="§"/>
-            </a:pPr>
-            <a:r>
-              <a:rPr lang="en-US" smtClean="0"/>
-              <a:t>Big Data</a:t>
-            </a:r>
-          </a:p>
-          <a:p>
-            <a:pPr lvl="1">
-              <a:buFont typeface="Wingdings" pitchFamily="2" charset="2"/>
-              <a:buChar char="§"/>
-            </a:pPr>
-            <a:r>
-              <a:rPr lang="en-US" smtClean="0"/>
-              <a:t>Data Analysis</a:t>
-            </a:r>
-          </a:p>
-          <a:p>
-            <a:pPr lvl="1">
-              <a:buFont typeface="Wingdings" pitchFamily="2" charset="2"/>
-              <a:buChar char="§"/>
-            </a:pPr>
-            <a:endParaRPr lang="en-US" smtClean="0"/>
-          </a:p>
-          <a:p>
-            <a:r>
-              <a:rPr lang="en-US" smtClean="0"/>
-              <a:t>Professional experience with SQL for more than 10 years</a:t>
-            </a:r>
-            <a:endParaRPr lang="ru-RU" dirty="0"/>
-          </a:p>
-        </p:txBody>
-      </p:sp>
-      <p:pic>
-        <p:nvPicPr>
-          <p:cNvPr id="8" name="Рисунок 7"/>
-          <p:cNvPicPr>
-            <a:picLocks noChangeAspect="1"/>
-          </p:cNvPicPr>
-          <p:nvPr/>
-        </p:nvPicPr>
-        <p:blipFill>
-          <a:blip r:embed="rId3">
-            <a:extLst>
-              <a:ext uri="{28A0092B-C50C-407E-A947-70E740481C1C}">
-                <a14:useLocalDpi xmlns:a14="http://schemas.microsoft.com/office/drawing/2010/main" val="0"/>
-              </a:ext>
-            </a:extLst>
-          </a:blip>
-          <a:stretch>
-            <a:fillRect/>
-          </a:stretch>
-        </p:blipFill>
-        <p:spPr>
-          <a:xfrm>
-            <a:off x="258185" y="1016576"/>
-            <a:ext cx="3720011" cy="4955750"/>
-          </a:xfrm>
-          <a:prstGeom prst="rect">
-            <a:avLst/>
-          </a:prstGeom>
-          <a:ln>
-            <a:noFill/>
-          </a:ln>
-          <a:effectLst>
-            <a:softEdge rad="112500"/>
-          </a:effectLst>
-        </p:spPr>
-      </p:pic>
-      <p:sp>
-        <p:nvSpPr>
-          <p:cNvPr id="3" name="Номер слайда 2"/>
-          <p:cNvSpPr>
-            <a:spLocks noGrp="1"/>
-          </p:cNvSpPr>
-          <p:nvPr>
-            <p:ph type="sldNum" sz="quarter" idx="12"/>
-          </p:nvPr>
-        </p:nvSpPr>
-        <p:spPr/>
-        <p:txBody>
-          <a:bodyPr/>
-          <a:lstStyle/>
-          <a:p>
-            <a:r>
-              <a:rPr lang="en-US" dirty="0"/>
-              <a:t>Page </a:t>
-            </a:r>
-            <a:fld id="{D57F1E4F-1CFF-5643-939E-217C01CDF565}" type="slidenum">
-              <a:rPr lang="en-US"/>
-              <a:pPr/>
-              <a:t>2</a:t>
-            </a:fld>
-            <a:r>
-              <a:rPr lang="en-US" dirty="0"/>
-              <a:t> of </a:t>
-            </a:r>
-            <a:r>
-              <a:rPr lang="en-US" dirty="0" smtClean="0"/>
-              <a:t>26</a:t>
-            </a:r>
-            <a:endParaRPr lang="en-US" dirty="0" smtClean="0"/>
-          </a:p>
-        </p:txBody>
-      </p:sp>
-    </p:spTree>
-    <p:extLst>
-      <p:ext uri="{BB962C8B-B14F-4D97-AF65-F5344CB8AC3E}">
-        <p14:creationId xmlns:p14="http://schemas.microsoft.com/office/powerpoint/2010/main" val="1568432226"/>
-      </p:ext>
-    </p:extLst>
-  </p:cSld>
-  <p:clrMapOvr>
-    <a:masterClrMapping/>
-  </p:clrMapOvr>
-  <p:transition spd="med">
-    <p:pull/>
-  </p:transition>
-  <p:timing>
-    <p:tnLst>
-      <p:par>
-        <p:cTn id="1" dur="indefinite" restart="never" nodeType="tmRoot"/>
-      </p:par>
-    </p:tnLst>
-  </p:timing>
-</p:sld>
-</file>
-
-<file path=ppt/slides/slide20.xml><?xml version="1.0" encoding="utf-8"?>
+<file path=ppt/slides/slide21.xml><?xml version="1.0" encoding="utf-8"?>
 <p:sld xmlns:a="http://schemas.openxmlformats.org/drawingml/2006/main" xmlns:r="http://schemas.openxmlformats.org/officeDocument/2006/relationships" xmlns:p="http://schemas.openxmlformats.org/presentationml/2006/main">
   <p:cSld>
     <p:spTree>
@@ -38976,7 +39220,7 @@
             <a:fld id="{D57F1E4F-1CFF-5643-939E-217C01CDF565}" type="slidenum">
               <a:rPr lang="en-US"/>
               <a:pPr/>
-              <a:t>20</a:t>
+              <a:t>21</a:t>
             </a:fld>
             <a:r>
               <a:rPr lang="en-US" dirty="0"/>
@@ -38984,7 +39228,7 @@
             </a:r>
             <a:r>
               <a:rPr lang="en-US" dirty="0" smtClean="0"/>
-              <a:t>26</a:t>
+              <a:t>27</a:t>
             </a:r>
             <a:endParaRPr lang="en-US" dirty="0"/>
           </a:p>
@@ -39155,7 +39399,7 @@
 </p:sld>
 </file>
 
-<file path=ppt/slides/slide21.xml><?xml version="1.0" encoding="utf-8"?>
+<file path=ppt/slides/slide22.xml><?xml version="1.0" encoding="utf-8"?>
 <p:sld xmlns:a="http://schemas.openxmlformats.org/drawingml/2006/main" xmlns:r="http://schemas.openxmlformats.org/officeDocument/2006/relationships" xmlns:p="http://schemas.openxmlformats.org/presentationml/2006/main">
   <p:cSld>
     <p:spTree>
@@ -39474,7 +39718,7 @@
             <a:fld id="{D57F1E4F-1CFF-5643-939E-217C01CDF565}" type="slidenum">
               <a:rPr lang="en-US"/>
               <a:pPr/>
-              <a:t>21</a:t>
+              <a:t>22</a:t>
             </a:fld>
             <a:r>
               <a:rPr lang="en-US" dirty="0"/>
@@ -39482,7 +39726,7 @@
             </a:r>
             <a:r>
               <a:rPr lang="en-US" dirty="0" smtClean="0"/>
-              <a:t>26</a:t>
+              <a:t>27</a:t>
             </a:r>
             <a:endParaRPr lang="en-US" dirty="0"/>
           </a:p>
@@ -39511,7 +39755,7 @@
 </p:sld>
 </file>
 
-<file path=ppt/slides/slide22.xml><?xml version="1.0" encoding="utf-8"?>
+<file path=ppt/slides/slide23.xml><?xml version="1.0" encoding="utf-8"?>
 <p:sld xmlns:a="http://schemas.openxmlformats.org/drawingml/2006/main" xmlns:r="http://schemas.openxmlformats.org/officeDocument/2006/relationships" xmlns:p="http://schemas.openxmlformats.org/presentationml/2006/main">
   <p:cSld>
     <p:spTree>
@@ -40025,7 +40269,7 @@
             <a:fld id="{D57F1E4F-1CFF-5643-939E-217C01CDF565}" type="slidenum">
               <a:rPr lang="en-US"/>
               <a:pPr/>
-              <a:t>22</a:t>
+              <a:t>23</a:t>
             </a:fld>
             <a:r>
               <a:rPr lang="en-US" dirty="0"/>
@@ -40033,7 +40277,7 @@
             </a:r>
             <a:r>
               <a:rPr lang="en-US" dirty="0" smtClean="0"/>
-              <a:t>26</a:t>
+              <a:t>27</a:t>
             </a:r>
             <a:endParaRPr lang="en-US" dirty="0"/>
           </a:p>
@@ -40355,7 +40599,7 @@
 </p:sld>
 </file>
 
-<file path=ppt/slides/slide23.xml><?xml version="1.0" encoding="utf-8"?>
+<file path=ppt/slides/slide24.xml><?xml version="1.0" encoding="utf-8"?>
 <p:sld xmlns:a="http://schemas.openxmlformats.org/drawingml/2006/main" xmlns:r="http://schemas.openxmlformats.org/officeDocument/2006/relationships" xmlns:p="http://schemas.openxmlformats.org/presentationml/2006/main">
   <p:cSld>
     <p:spTree>
@@ -42167,7 +42411,7 @@
             <a:fld id="{D57F1E4F-1CFF-5643-939E-217C01CDF565}" type="slidenum">
               <a:rPr lang="en-US"/>
               <a:pPr/>
-              <a:t>23</a:t>
+              <a:t>24</a:t>
             </a:fld>
             <a:r>
               <a:rPr lang="en-US" dirty="0"/>
@@ -42175,7 +42419,7 @@
             </a:r>
             <a:r>
               <a:rPr lang="en-US" dirty="0" smtClean="0"/>
-              <a:t>26</a:t>
+              <a:t>27</a:t>
             </a:r>
             <a:endParaRPr lang="en-US" dirty="0"/>
           </a:p>
@@ -42866,7 +43110,7 @@
 </p:sld>
 </file>
 
-<file path=ppt/slides/slide24.xml><?xml version="1.0" encoding="utf-8"?>
+<file path=ppt/slides/slide25.xml><?xml version="1.0" encoding="utf-8"?>
 <p:sld xmlns:a="http://schemas.openxmlformats.org/drawingml/2006/main" xmlns:r="http://schemas.openxmlformats.org/officeDocument/2006/relationships" xmlns:p="http://schemas.openxmlformats.org/presentationml/2006/main">
   <p:cSld>
     <p:spTree>
@@ -45007,7 +45251,7 @@
             <a:fld id="{D57F1E4F-1CFF-5643-939E-217C01CDF565}" type="slidenum">
               <a:rPr lang="en-US"/>
               <a:pPr/>
-              <a:t>24</a:t>
+              <a:t>25</a:t>
             </a:fld>
             <a:r>
               <a:rPr lang="en-US" dirty="0"/>
@@ -45015,7 +45259,7 @@
             </a:r>
             <a:r>
               <a:rPr lang="en-US" dirty="0" smtClean="0"/>
-              <a:t>26</a:t>
+              <a:t>27</a:t>
             </a:r>
             <a:endParaRPr lang="en-US" dirty="0"/>
           </a:p>
@@ -45044,7 +45288,7 @@
 </p:sld>
 </file>
 
-<file path=ppt/slides/slide25.xml><?xml version="1.0" encoding="utf-8"?>
+<file path=ppt/slides/slide26.xml><?xml version="1.0" encoding="utf-8"?>
 <p:sld xmlns:a="http://schemas.openxmlformats.org/drawingml/2006/main" xmlns:r="http://schemas.openxmlformats.org/officeDocument/2006/relationships" xmlns:p="http://schemas.openxmlformats.org/presentationml/2006/main">
   <p:cSld>
     <p:spTree>
@@ -45624,7 +45868,7 @@
             <a:fld id="{D57F1E4F-1CFF-5643-939E-217C01CDF565}" type="slidenum">
               <a:rPr lang="en-US"/>
               <a:pPr/>
-              <a:t>25</a:t>
+              <a:t>26</a:t>
             </a:fld>
             <a:r>
               <a:rPr lang="en-US" dirty="0"/>
@@ -45632,7 +45876,7 @@
             </a:r>
             <a:r>
               <a:rPr lang="en-US" dirty="0" smtClean="0"/>
-              <a:t>26</a:t>
+              <a:t>27</a:t>
             </a:r>
             <a:endParaRPr lang="en-US" dirty="0"/>
           </a:p>
@@ -45661,7 +45905,7 @@
 </p:sld>
 </file>
 
-<file path=ppt/slides/slide26.xml><?xml version="1.0" encoding="utf-8"?>
+<file path=ppt/slides/slide27.xml><?xml version="1.0" encoding="utf-8"?>
 <p:sld xmlns:a="http://schemas.openxmlformats.org/drawingml/2006/main" xmlns:r="http://schemas.openxmlformats.org/officeDocument/2006/relationships" xmlns:p="http://schemas.openxmlformats.org/presentationml/2006/main">
   <p:cSld>
     <p:spTree>
@@ -45772,7 +46016,7 @@
             <a:fld id="{D57F1E4F-1CFF-5643-939E-217C01CDF565}" type="slidenum">
               <a:rPr lang="en-US"/>
               <a:pPr/>
-              <a:t>26</a:t>
+              <a:t>27</a:t>
             </a:fld>
             <a:r>
               <a:rPr lang="en-US" dirty="0"/>
@@ -45780,7 +46024,7 @@
             </a:r>
             <a:r>
               <a:rPr lang="en-US" dirty="0" smtClean="0"/>
-              <a:t>26</a:t>
+              <a:t>27</a:t>
             </a:r>
             <a:endParaRPr lang="en-US" dirty="0"/>
           </a:p>
@@ -45982,7 +46226,7 @@
             </a:r>
             <a:r>
               <a:rPr lang="en-US" dirty="0" smtClean="0"/>
-              <a:t>26</a:t>
+              <a:t>27</a:t>
             </a:r>
             <a:endParaRPr lang="en-US" dirty="0"/>
           </a:p>
@@ -46793,7 +47037,7 @@
         </p:nvSpPr>
         <p:spPr>
           <a:xfrm>
-            <a:off x="2387600" y="2364432"/>
+            <a:off x="2387600" y="1271175"/>
             <a:ext cx="7416800" cy="639762"/>
           </a:xfrm>
         </p:spPr>
@@ -46806,7 +47050,11 @@
             <a:pPr lvl="0"/>
             <a:r>
               <a:rPr lang="en-US" dirty="0"/>
-              <a:t>Generating random birthdays</a:t>
+              <a:t>Generating random </a:t>
+            </a:r>
+            <a:r>
+              <a:rPr lang="en-US" dirty="0" smtClean="0"/>
+              <a:t>names</a:t>
             </a:r>
             <a:endParaRPr lang="ru-RU" dirty="0"/>
           </a:p>
@@ -46873,7 +47121,7 @@
             </a:r>
             <a:r>
               <a:rPr lang="en-US" dirty="0" smtClean="0"/>
-              <a:t>26</a:t>
+              <a:t>27</a:t>
             </a:r>
             <a:endParaRPr lang="en-US" dirty="0"/>
           </a:p>
@@ -46881,28 +47129,45 @@
       </p:sp>
       <p:pic>
         <p:nvPicPr>
-          <p:cNvPr id="12" name="Объект 11"/>
+          <p:cNvPr id="1032" name="Picture 8" descr="C:\Users\Igor\AppData\Local\Temp\SNAGHTML41c41e91.PNG"/>
           <p:cNvPicPr>
-            <a:picLocks noGrp="1" noChangeAspect="1"/>
+            <a:picLocks noGrp="1" noChangeAspect="1" noChangeArrowheads="1"/>
           </p:cNvPicPr>
           <p:nvPr>
             <p:ph sz="half" idx="2"/>
           </p:nvPr>
         </p:nvPicPr>
         <p:blipFill>
-          <a:blip r:embed="rId2"/>
+          <a:blip r:embed="rId3">
+            <a:extLst>
+              <a:ext uri="{28A0092B-C50C-407E-A947-70E740481C1C}">
+                <a14:useLocalDpi xmlns:a14="http://schemas.microsoft.com/office/drawing/2010/main" val="0"/>
+              </a:ext>
+            </a:extLst>
+          </a:blip>
+          <a:srcRect/>
           <a:stretch>
             <a:fillRect/>
           </a:stretch>
         </p:blipFill>
-        <p:spPr>
+        <p:spPr bwMode="auto">
           <a:xfrm>
-            <a:off x="657991" y="3004194"/>
-            <a:ext cx="10924409" cy="2470535"/>
+            <a:off x="3300888" y="1850801"/>
+            <a:ext cx="5590224" cy="4459499"/>
           </a:xfrm>
           <a:prstGeom prst="rect">
             <a:avLst/>
           </a:prstGeom>
+          <a:noFill/>
+          <a:extLst>
+            <a:ext uri="{909E8E84-426E-40DD-AFC4-6F175D3DCCD1}">
+              <a14:hiddenFill xmlns:a14="http://schemas.microsoft.com/office/drawing/2010/main">
+                <a:solidFill>
+                  <a:srgbClr val="FFFFFF"/>
+                </a:solidFill>
+              </a14:hiddenFill>
+            </a:ext>
+          </a:extLst>
         </p:spPr>
       </p:pic>
     </p:spTree>
@@ -46974,6 +47239,197 @@
       </p:sp>
       <p:sp>
         <p:nvSpPr>
+          <p:cNvPr id="7" name="Текст 6"/>
+          <p:cNvSpPr>
+            <a:spLocks noGrp="1"/>
+          </p:cNvSpPr>
+          <p:nvPr>
+            <p:ph type="body" idx="1"/>
+          </p:nvPr>
+        </p:nvSpPr>
+        <p:spPr>
+          <a:xfrm>
+            <a:off x="2387600" y="2364432"/>
+            <a:ext cx="7416800" cy="639762"/>
+          </a:xfrm>
+        </p:spPr>
+        <p:txBody>
+          <a:bodyPr>
+            <a:normAutofit/>
+          </a:bodyPr>
+          <a:lstStyle/>
+          <a:p>
+            <a:pPr lvl="0"/>
+            <a:r>
+              <a:rPr lang="en-US" dirty="0"/>
+              <a:t>Generating random birthdays</a:t>
+            </a:r>
+            <a:endParaRPr lang="ru-RU" dirty="0"/>
+          </a:p>
+        </p:txBody>
+      </p:sp>
+      <p:sp>
+        <p:nvSpPr>
+          <p:cNvPr id="4" name="Нижний колонтитул 3"/>
+          <p:cNvSpPr>
+            <a:spLocks noGrp="1"/>
+          </p:cNvSpPr>
+          <p:nvPr>
+            <p:ph type="ftr" sz="quarter" idx="11"/>
+          </p:nvPr>
+        </p:nvSpPr>
+        <p:spPr/>
+        <p:txBody>
+          <a:bodyPr/>
+          <a:lstStyle/>
+          <a:p>
+            <a:r>
+              <a:rPr lang="en-US" sz="1800" dirty="0" smtClean="0"/>
+              <a:t>© Igor </a:t>
+            </a:r>
+            <a:r>
+              <a:rPr lang="en-US" sz="1800" dirty="0" err="1" smtClean="0"/>
+              <a:t>Gorbenko</a:t>
+            </a:r>
+            <a:r>
+              <a:rPr lang="en-US" sz="1800" dirty="0" smtClean="0"/>
+              <a:t>, SPB, 2018</a:t>
+            </a:r>
+            <a:endParaRPr lang="en-US" sz="1800" dirty="0"/>
+          </a:p>
+        </p:txBody>
+      </p:sp>
+      <p:sp>
+        <p:nvSpPr>
+          <p:cNvPr id="5" name="Номер слайда 4"/>
+          <p:cNvSpPr>
+            <a:spLocks noGrp="1"/>
+          </p:cNvSpPr>
+          <p:nvPr>
+            <p:ph type="sldNum" sz="quarter" idx="12"/>
+          </p:nvPr>
+        </p:nvSpPr>
+        <p:spPr/>
+        <p:txBody>
+          <a:bodyPr/>
+          <a:lstStyle/>
+          <a:p>
+            <a:r>
+              <a:rPr lang="en-US" dirty="0"/>
+              <a:t>Page </a:t>
+            </a:r>
+            <a:fld id="{D57F1E4F-1CFF-5643-939E-217C01CDF565}" type="slidenum">
+              <a:rPr lang="en-US"/>
+              <a:pPr/>
+              <a:t>5</a:t>
+            </a:fld>
+            <a:r>
+              <a:rPr lang="en-US" dirty="0"/>
+              <a:t> of </a:t>
+            </a:r>
+            <a:r>
+              <a:rPr lang="en-US" dirty="0" smtClean="0"/>
+              <a:t>27</a:t>
+            </a:r>
+            <a:endParaRPr lang="en-US" dirty="0"/>
+          </a:p>
+        </p:txBody>
+      </p:sp>
+      <p:pic>
+        <p:nvPicPr>
+          <p:cNvPr id="12" name="Объект 11"/>
+          <p:cNvPicPr>
+            <a:picLocks noGrp="1" noChangeAspect="1"/>
+          </p:cNvPicPr>
+          <p:nvPr>
+            <p:ph sz="half" idx="2"/>
+          </p:nvPr>
+        </p:nvPicPr>
+        <p:blipFill>
+          <a:blip r:embed="rId2"/>
+          <a:stretch>
+            <a:fillRect/>
+          </a:stretch>
+        </p:blipFill>
+        <p:spPr>
+          <a:xfrm>
+            <a:off x="657991" y="3004194"/>
+            <a:ext cx="10924409" cy="2470535"/>
+          </a:xfrm>
+          <a:prstGeom prst="rect">
+            <a:avLst/>
+          </a:prstGeom>
+        </p:spPr>
+      </p:pic>
+    </p:spTree>
+    <p:extLst>
+      <p:ext uri="{BB962C8B-B14F-4D97-AF65-F5344CB8AC3E}">
+        <p14:creationId xmlns:p14="http://schemas.microsoft.com/office/powerpoint/2010/main" val="2430300605"/>
+      </p:ext>
+    </p:extLst>
+  </p:cSld>
+  <p:clrMapOvr>
+    <a:masterClrMapping/>
+  </p:clrMapOvr>
+  <p:transition spd="slow">
+    <p:split orient="vert"/>
+  </p:transition>
+  <p:timing>
+    <p:tnLst>
+      <p:par>
+        <p:cTn id="1" dur="indefinite" restart="never" nodeType="tmRoot"/>
+      </p:par>
+    </p:tnLst>
+  </p:timing>
+</p:sld>
+</file>
+
+<file path=ppt/slides/slide6.xml><?xml version="1.0" encoding="utf-8"?>
+<p:sld xmlns:a="http://schemas.openxmlformats.org/drawingml/2006/main" xmlns:r="http://schemas.openxmlformats.org/officeDocument/2006/relationships" xmlns:p="http://schemas.openxmlformats.org/presentationml/2006/main">
+  <p:cSld>
+    <p:spTree>
+      <p:nvGrpSpPr>
+        <p:cNvPr id="1" name=""/>
+        <p:cNvGrpSpPr/>
+        <p:nvPr/>
+      </p:nvGrpSpPr>
+      <p:grpSpPr>
+        <a:xfrm>
+          <a:off x="0" y="0"/>
+          <a:ext cx="0" cy="0"/>
+          <a:chOff x="0" y="0"/>
+          <a:chExt cx="0" cy="0"/>
+        </a:xfrm>
+      </p:grpSpPr>
+      <p:sp>
+        <p:nvSpPr>
+          <p:cNvPr id="2" name="Заголовок 1"/>
+          <p:cNvSpPr>
+            <a:spLocks noGrp="1"/>
+          </p:cNvSpPr>
+          <p:nvPr>
+            <p:ph type="title"/>
+          </p:nvPr>
+        </p:nvSpPr>
+        <p:spPr/>
+        <p:txBody>
+          <a:bodyPr/>
+          <a:lstStyle/>
+          <a:p>
+            <a:r>
+              <a:rPr lang="ru-RU" dirty="0" smtClean="0"/>
+              <a:t>1. </a:t>
+            </a:r>
+            <a:r>
+              <a:rPr lang="en-US" dirty="0"/>
+              <a:t>Table with random data</a:t>
+            </a:r>
+            <a:endParaRPr lang="ru-RU" dirty="0"/>
+          </a:p>
+        </p:txBody>
+      </p:sp>
+      <p:sp>
+        <p:nvSpPr>
           <p:cNvPr id="11" name="Текст 10"/>
           <p:cNvSpPr>
             <a:spLocks noGrp="1"/>
@@ -47078,7 +47534,7 @@
             <a:fld id="{D57F1E4F-1CFF-5643-939E-217C01CDF565}" type="slidenum">
               <a:rPr lang="en-US"/>
               <a:pPr/>
-              <a:t>5</a:t>
+              <a:t>6</a:t>
             </a:fld>
             <a:r>
               <a:rPr lang="en-US" dirty="0"/>
@@ -47086,7 +47542,7 @@
             </a:r>
             <a:r>
               <a:rPr lang="en-US" dirty="0" smtClean="0"/>
-              <a:t>26</a:t>
+              <a:t>27</a:t>
             </a:r>
             <a:endParaRPr lang="en-US" dirty="0"/>
           </a:p>
@@ -47115,7 +47571,7 @@
 </p:sld>
 </file>
 
-<file path=ppt/slides/slide6.xml><?xml version="1.0" encoding="utf-8"?>
+<file path=ppt/slides/slide7.xml><?xml version="1.0" encoding="utf-8"?>
 <p:sld xmlns:a="http://schemas.openxmlformats.org/drawingml/2006/main" xmlns:r="http://schemas.openxmlformats.org/officeDocument/2006/relationships" xmlns:p="http://schemas.openxmlformats.org/presentationml/2006/main">
   <p:cSld>
     <p:spTree>
@@ -47506,7 +47962,7 @@
             <a:fld id="{D57F1E4F-1CFF-5643-939E-217C01CDF565}" type="slidenum">
               <a:rPr lang="en-US"/>
               <a:pPr/>
-              <a:t>6</a:t>
+              <a:t>7</a:t>
             </a:fld>
             <a:r>
               <a:rPr lang="en-US" dirty="0"/>
@@ -47514,7 +47970,7 @@
             </a:r>
             <a:r>
               <a:rPr lang="en-US" dirty="0" smtClean="0"/>
-              <a:t>26</a:t>
+              <a:t>27</a:t>
             </a:r>
             <a:endParaRPr lang="en-US" dirty="0"/>
           </a:p>
@@ -47543,7 +47999,7 @@
 </p:sld>
 </file>
 
-<file path=ppt/slides/slide7.xml><?xml version="1.0" encoding="utf-8"?>
+<file path=ppt/slides/slide8.xml><?xml version="1.0" encoding="utf-8"?>
 <p:sld xmlns:a="http://schemas.openxmlformats.org/drawingml/2006/main" xmlns:r="http://schemas.openxmlformats.org/officeDocument/2006/relationships" xmlns:p="http://schemas.openxmlformats.org/presentationml/2006/main">
   <p:cSld>
     <p:spTree>
@@ -47701,7 +48157,7 @@
             <a:fld id="{D57F1E4F-1CFF-5643-939E-217C01CDF565}" type="slidenum">
               <a:rPr lang="en-US"/>
               <a:pPr/>
-              <a:t>7</a:t>
+              <a:t>8</a:t>
             </a:fld>
             <a:r>
               <a:rPr lang="en-US" dirty="0"/>
@@ -47709,7 +48165,7 @@
             </a:r>
             <a:r>
               <a:rPr lang="en-US" dirty="0" smtClean="0"/>
-              <a:t>26</a:t>
+              <a:t>27</a:t>
             </a:r>
             <a:endParaRPr lang="en-US" dirty="0"/>
           </a:p>
@@ -47817,7 +48273,7 @@
 </p:sld>
 </file>
 
-<file path=ppt/slides/slide8.xml><?xml version="1.0" encoding="utf-8"?>
+<file path=ppt/slides/slide9.xml><?xml version="1.0" encoding="utf-8"?>
 <p:sld xmlns:a="http://schemas.openxmlformats.org/drawingml/2006/main" xmlns:r="http://schemas.openxmlformats.org/officeDocument/2006/relationships" xmlns:p="http://schemas.openxmlformats.org/presentationml/2006/main">
   <p:cSld>
     <p:spTree>
@@ -47961,7 +48417,7 @@
             <a:fld id="{D57F1E4F-1CFF-5643-939E-217C01CDF565}" type="slidenum">
               <a:rPr lang="en-US"/>
               <a:pPr/>
-              <a:t>8</a:t>
+              <a:t>9</a:t>
             </a:fld>
             <a:r>
               <a:rPr lang="en-US" dirty="0"/>
@@ -47969,7 +48425,7 @@
             </a:r>
             <a:r>
               <a:rPr lang="en-US" dirty="0" smtClean="0"/>
-              <a:t>26</a:t>
+              <a:t>27</a:t>
             </a:r>
             <a:endParaRPr lang="en-US" dirty="0"/>
           </a:p>
@@ -48539,178 +48995,6 @@
         </p:bldSub>
       </p:bldGraphic>
     </p:bldLst>
-  </p:timing>
-</p:sld>
-</file>
-
-<file path=ppt/slides/slide9.xml><?xml version="1.0" encoding="utf-8"?>
-<p:sld xmlns:a="http://schemas.openxmlformats.org/drawingml/2006/main" xmlns:r="http://schemas.openxmlformats.org/officeDocument/2006/relationships" xmlns:p="http://schemas.openxmlformats.org/presentationml/2006/main">
-  <p:cSld>
-    <p:spTree>
-      <p:nvGrpSpPr>
-        <p:cNvPr id="1" name=""/>
-        <p:cNvGrpSpPr/>
-        <p:nvPr/>
-      </p:nvGrpSpPr>
-      <p:grpSpPr>
-        <a:xfrm>
-          <a:off x="0" y="0"/>
-          <a:ext cx="0" cy="0"/>
-          <a:chOff x="0" y="0"/>
-          <a:chExt cx="0" cy="0"/>
-        </a:xfrm>
-      </p:grpSpPr>
-      <p:sp>
-        <p:nvSpPr>
-          <p:cNvPr id="4" name="Нижний колонтитул 3"/>
-          <p:cNvSpPr>
-            <a:spLocks noGrp="1"/>
-          </p:cNvSpPr>
-          <p:nvPr>
-            <p:ph type="ftr" sz="quarter" idx="11"/>
-          </p:nvPr>
-        </p:nvSpPr>
-        <p:spPr/>
-        <p:txBody>
-          <a:bodyPr/>
-          <a:lstStyle/>
-          <a:p>
-            <a:r>
-              <a:rPr lang="en-US" sz="1800" dirty="0" smtClean="0"/>
-              <a:t>© Igor </a:t>
-            </a:r>
-            <a:r>
-              <a:rPr lang="en-US" sz="1800" dirty="0" err="1" smtClean="0"/>
-              <a:t>Gorbenko</a:t>
-            </a:r>
-            <a:r>
-              <a:rPr lang="en-US" sz="1800" dirty="0" smtClean="0"/>
-              <a:t>, SPB, 2018</a:t>
-            </a:r>
-            <a:endParaRPr lang="en-US" sz="1800" dirty="0"/>
-          </a:p>
-        </p:txBody>
-      </p:sp>
-      <p:sp>
-        <p:nvSpPr>
-          <p:cNvPr id="5" name="Номер слайда 4"/>
-          <p:cNvSpPr>
-            <a:spLocks noGrp="1"/>
-          </p:cNvSpPr>
-          <p:nvPr>
-            <p:ph type="sldNum" sz="quarter" idx="12"/>
-          </p:nvPr>
-        </p:nvSpPr>
-        <p:spPr/>
-        <p:txBody>
-          <a:bodyPr/>
-          <a:lstStyle/>
-          <a:p>
-            <a:r>
-              <a:rPr lang="en-US" dirty="0"/>
-              <a:t>Page </a:t>
-            </a:r>
-            <a:fld id="{D57F1E4F-1CFF-5643-939E-217C01CDF565}" type="slidenum">
-              <a:rPr lang="en-US"/>
-              <a:pPr/>
-              <a:t>9</a:t>
-            </a:fld>
-            <a:r>
-              <a:rPr lang="en-US" dirty="0"/>
-              <a:t> of </a:t>
-            </a:r>
-            <a:r>
-              <a:rPr lang="en-US" dirty="0" smtClean="0"/>
-              <a:t>26</a:t>
-            </a:r>
-            <a:endParaRPr lang="en-US" dirty="0"/>
-          </a:p>
-        </p:txBody>
-      </p:sp>
-      <p:sp>
-        <p:nvSpPr>
-          <p:cNvPr id="2" name="Заголовок 1"/>
-          <p:cNvSpPr>
-            <a:spLocks noGrp="1"/>
-          </p:cNvSpPr>
-          <p:nvPr>
-            <p:ph type="title"/>
-          </p:nvPr>
-        </p:nvSpPr>
-        <p:spPr>
-          <a:xfrm>
-            <a:off x="787402" y="938035"/>
-            <a:ext cx="10337798" cy="558800"/>
-          </a:xfrm>
-        </p:spPr>
-        <p:txBody>
-          <a:bodyPr>
-            <a:noAutofit/>
-          </a:bodyPr>
-          <a:lstStyle/>
-          <a:p>
-            <a:pPr algn="r"/>
-            <a:r>
-              <a:rPr lang="en-US" sz="4000" dirty="0" smtClean="0"/>
-              <a:t>3</a:t>
-            </a:r>
-            <a:r>
-              <a:rPr lang="ru-RU" sz="4000" dirty="0" smtClean="0"/>
-              <a:t>. </a:t>
-            </a:r>
-            <a:r>
-              <a:rPr lang="en-US" sz="4000" dirty="0"/>
-              <a:t>The closest birthday this week and the age of the client</a:t>
-            </a:r>
-            <a:endParaRPr lang="ru-RU" sz="4000" dirty="0"/>
-          </a:p>
-        </p:txBody>
-      </p:sp>
-      <p:pic>
-        <p:nvPicPr>
-          <p:cNvPr id="11" name="Объект 10"/>
-          <p:cNvPicPr>
-            <a:picLocks noGrp="1" noChangeAspect="1"/>
-          </p:cNvPicPr>
-          <p:nvPr>
-            <p:ph idx="1"/>
-          </p:nvPr>
-        </p:nvPicPr>
-        <p:blipFill>
-          <a:blip r:embed="rId2"/>
-          <a:stretch>
-            <a:fillRect/>
-          </a:stretch>
-        </p:blipFill>
-        <p:spPr>
-          <a:xfrm>
-            <a:off x="1010445" y="1579225"/>
-            <a:ext cx="9891711" cy="4588549"/>
-          </a:xfrm>
-          <a:prstGeom prst="rect">
-            <a:avLst/>
-          </a:prstGeom>
-        </p:spPr>
-      </p:pic>
-    </p:spTree>
-    <p:extLst>
-      <p:ext uri="{BB962C8B-B14F-4D97-AF65-F5344CB8AC3E}">
-        <p14:creationId xmlns:p14="http://schemas.microsoft.com/office/powerpoint/2010/main" val="525399833"/>
-      </p:ext>
-    </p:extLst>
-  </p:cSld>
-  <p:clrMapOvr>
-    <a:masterClrMapping/>
-  </p:clrMapOvr>
-  <p:transition spd="slow">
-    <p:split orient="vert"/>
-  </p:transition>
-  <p:timing>
-    <p:tnLst>
-      <p:par>
-        <p:cTn id="1" dur="indefinite" restart="never" nodeType="tmRoot"/>
-      </p:par>
-    </p:tnLst>
   </p:timing>
 </p:sld>
 </file>

</xml_diff>